<commit_message>
Correct some presentations in module 1
</commit_message>
<xml_diff>
--- a/03. Page Navigation/3. Page Navigation.pptx
+++ b/03. Page Navigation/3. Page Navigation.pptx
@@ -8,30 +8,31 @@
     <p:sldMasterId id="2147483744" r:id="rId7"/>
   </p:sldMasterIdLst>
   <p:notesMasterIdLst>
-    <p:notesMasterId r:id="rId26"/>
+    <p:notesMasterId r:id="rId27"/>
   </p:notesMasterIdLst>
   <p:handoutMasterIdLst>
-    <p:handoutMasterId r:id="rId27"/>
+    <p:handoutMasterId r:id="rId28"/>
   </p:handoutMasterIdLst>
   <p:sldIdLst>
     <p:sldId id="272" r:id="rId8"/>
     <p:sldId id="327" r:id="rId9"/>
     <p:sldId id="332" r:id="rId10"/>
-    <p:sldId id="315" r:id="rId11"/>
-    <p:sldId id="312" r:id="rId12"/>
-    <p:sldId id="333" r:id="rId13"/>
-    <p:sldId id="334" r:id="rId14"/>
-    <p:sldId id="335" r:id="rId15"/>
-    <p:sldId id="337" r:id="rId16"/>
-    <p:sldId id="340" r:id="rId17"/>
-    <p:sldId id="341" r:id="rId18"/>
-    <p:sldId id="342" r:id="rId19"/>
-    <p:sldId id="343" r:id="rId20"/>
-    <p:sldId id="344" r:id="rId21"/>
-    <p:sldId id="345" r:id="rId22"/>
-    <p:sldId id="326" r:id="rId23"/>
-    <p:sldId id="300" r:id="rId24"/>
-    <p:sldId id="301" r:id="rId25"/>
+    <p:sldId id="346" r:id="rId11"/>
+    <p:sldId id="315" r:id="rId12"/>
+    <p:sldId id="312" r:id="rId13"/>
+    <p:sldId id="333" r:id="rId14"/>
+    <p:sldId id="334" r:id="rId15"/>
+    <p:sldId id="335" r:id="rId16"/>
+    <p:sldId id="337" r:id="rId17"/>
+    <p:sldId id="340" r:id="rId18"/>
+    <p:sldId id="341" r:id="rId19"/>
+    <p:sldId id="342" r:id="rId20"/>
+    <p:sldId id="343" r:id="rId21"/>
+    <p:sldId id="344" r:id="rId22"/>
+    <p:sldId id="345" r:id="rId23"/>
+    <p:sldId id="326" r:id="rId24"/>
+    <p:sldId id="300" r:id="rId25"/>
+    <p:sldId id="301" r:id="rId26"/>
   </p:sldIdLst>
   <p:sldSz cx="12192000" cy="6858000"/>
   <p:notesSz cx="6858000" cy="9144000"/>
@@ -223,7 +224,7 @@
           <a:p>
             <a:fld id="{94239FBE-FC08-4336-9B53-CDE8BC5ED33D}" type="datetimeFigureOut">
               <a:rPr lang="ru-RU" smtClean="0"/>
-              <a:t>06.12.2015</a:t>
+              <a:t>07.12.2015</a:t>
             </a:fld>
             <a:endParaRPr lang="ru-RU"/>
           </a:p>
@@ -388,7 +389,7 @@
           <a:p>
             <a:fld id="{135EBF37-D0C5-4B7C-9D35-9D2E20CA27EC}" type="datetimeFigureOut">
               <a:rPr lang="ru-RU" smtClean="0"/>
-              <a:t>06.12.2015</a:t>
+              <a:t>07.12.2015</a:t>
             </a:fld>
             <a:endParaRPr lang="ru-RU"/>
           </a:p>
@@ -1077,7 +1078,7 @@
                   <a:spcPct val="0"/>
                 </a:spcAft>
               </a:pPr>
-              <a:t>12/6/2015 11:58 AM</a:t>
+              <a:t>12/7/2015 11:57 AM</a:t>
             </a:fld>
             <a:endParaRPr lang="en-US"/>
           </a:p>
@@ -1247,7 +1248,7 @@
                   <a:spcPct val="0"/>
                 </a:spcAft>
               </a:pPr>
-              <a:t>18</a:t>
+              <a:t>19</a:t>
             </a:fld>
             <a:endParaRPr lang="en-US"/>
           </a:p>
@@ -9856,7 +9857,7 @@
             <a:fld id="{B9E0730F-B7E3-6A47-BE8A-187D77555B7C}" type="datetimeFigureOut">
               <a:rPr lang="en-US" smtClean="0"/>
               <a:pPr/>
-              <a:t>12/6/2015</a:t>
+              <a:t>12/7/2015</a:t>
             </a:fld>
             <a:endParaRPr lang="en-US"/>
           </a:p>
@@ -26990,11 +26991,7 @@
             </a:pPr>
             <a:r>
               <a:rPr lang="ru-RU" sz="4000" dirty="0" smtClean="0"/>
-              <a:t>Введение в разработку </a:t>
-            </a:r>
-            <a:r>
-              <a:rPr lang="ru-RU" sz="4000" dirty="0" smtClean="0"/>
-              <a:t>универсальных приложений на платформе </a:t>
+              <a:t>Введение в разработку универсальных приложений на платформе </a:t>
             </a:r>
             <a:r>
               <a:rPr lang="en-US" sz="4000" dirty="0" smtClean="0"/>
@@ -27016,11 +27013,7 @@
             </a:r>
             <a:r>
               <a:rPr lang="ru-RU" sz="4000" dirty="0" smtClean="0"/>
-              <a:t>: </a:t>
-            </a:r>
-            <a:r>
-              <a:rPr lang="ru-RU" sz="4000" dirty="0" smtClean="0"/>
-              <a:t>Навигация между страницами</a:t>
+              <a:t>: Навигация между страницами</a:t>
             </a:r>
             <a:endParaRPr lang="ru-RU" sz="4000" dirty="0"/>
           </a:p>
@@ -27145,7 +27138,7 @@
       </p:grpSpPr>
       <p:sp>
         <p:nvSpPr>
-          <p:cNvPr id="3" name="Заголовок 2"/>
+          <p:cNvPr id="2" name="Title 1"/>
           <p:cNvSpPr>
             <a:spLocks noGrp="1"/>
           </p:cNvSpPr>
@@ -27165,15 +27158,15 @@
           <a:p>
             <a:r>
               <a:rPr lang="ru-RU" dirty="0" smtClean="0"/>
-              <a:t>Обработка перехода назад</a:t>
-            </a:r>
-            <a:endParaRPr lang="ru-RU" dirty="0"/>
+              <a:t>Обратная навигация</a:t>
+            </a:r>
+            <a:endParaRPr lang="en-US" dirty="0"/>
           </a:p>
         </p:txBody>
       </p:sp>
       <p:sp>
         <p:nvSpPr>
-          <p:cNvPr id="4" name="Объект 3"/>
+          <p:cNvPr id="3" name="Content Placeholder 2"/>
           <p:cNvSpPr>
             <a:spLocks noGrp="1"/>
           </p:cNvSpPr>
@@ -27183,964 +27176,86 @@
         </p:nvSpPr>
         <p:spPr>
           <a:xfrm>
-            <a:off x="525224" y="2169000"/>
-            <a:ext cx="7370776" cy="4500000"/>
+            <a:off x="554718" y="1449000"/>
+            <a:ext cx="7903576" cy="4860000"/>
           </a:xfrm>
         </p:spPr>
         <p:txBody>
-          <a:bodyPr>
-            <a:normAutofit fontScale="92500" lnSpcReduction="10000"/>
-          </a:bodyPr>
+          <a:bodyPr/>
           <a:lstStyle/>
           <a:p>
             <a:r>
-              <a:rPr lang="en-US" sz="1600" dirty="0" smtClean="0">
-                <a:solidFill>
-                  <a:srgbClr val="0000FF"/>
-                </a:solidFill>
-                <a:highlight>
-                  <a:srgbClr val="FFFFFF"/>
-                </a:highlight>
-              </a:rPr>
-              <a:t>protected</a:t>
-            </a:r>
-            <a:r>
-              <a:rPr lang="en-US" sz="1600" dirty="0" smtClean="0">
-                <a:solidFill>
-                  <a:srgbClr val="000000"/>
-                </a:solidFill>
-                <a:highlight>
-                  <a:srgbClr val="FFFFFF"/>
-                </a:highlight>
-              </a:rPr>
-              <a:t> </a:t>
-            </a:r>
-            <a:r>
-              <a:rPr lang="en-US" sz="1600" dirty="0">
-                <a:solidFill>
-                  <a:srgbClr val="0000FF"/>
-                </a:solidFill>
-                <a:highlight>
-                  <a:srgbClr val="FFFFFF"/>
-                </a:highlight>
-              </a:rPr>
-              <a:t>override</a:t>
-            </a:r>
-            <a:r>
-              <a:rPr lang="en-US" sz="1600" dirty="0">
-                <a:solidFill>
-                  <a:srgbClr val="000000"/>
-                </a:solidFill>
-                <a:highlight>
-                  <a:srgbClr val="FFFFFF"/>
-                </a:highlight>
-              </a:rPr>
-              <a:t> </a:t>
-            </a:r>
-            <a:r>
-              <a:rPr lang="en-US" sz="1600" dirty="0">
-                <a:solidFill>
-                  <a:srgbClr val="0000FF"/>
-                </a:solidFill>
-                <a:highlight>
-                  <a:srgbClr val="FFFFFF"/>
-                </a:highlight>
-              </a:rPr>
-              <a:t>void</a:t>
-            </a:r>
-            <a:r>
-              <a:rPr lang="en-US" sz="1600" dirty="0">
-                <a:solidFill>
-                  <a:srgbClr val="000000"/>
-                </a:solidFill>
-                <a:highlight>
-                  <a:srgbClr val="FFFFFF"/>
-                </a:highlight>
-              </a:rPr>
-              <a:t> </a:t>
-            </a:r>
-            <a:r>
-              <a:rPr lang="en-US" sz="1600" dirty="0" err="1">
-                <a:solidFill>
-                  <a:srgbClr val="000000"/>
-                </a:solidFill>
-                <a:highlight>
-                  <a:srgbClr val="FFFFFF"/>
-                </a:highlight>
-              </a:rPr>
-              <a:t>OnLaunched</a:t>
-            </a:r>
-            <a:r>
-              <a:rPr lang="en-US" sz="1600" dirty="0">
-                <a:solidFill>
-                  <a:srgbClr val="000000"/>
-                </a:solidFill>
-                <a:highlight>
-                  <a:srgbClr val="FFFFFF"/>
-                </a:highlight>
-              </a:rPr>
-              <a:t>(</a:t>
-            </a:r>
-            <a:r>
-              <a:rPr lang="en-US" sz="1600" dirty="0" err="1">
-                <a:solidFill>
-                  <a:srgbClr val="2B91AF"/>
-                </a:solidFill>
-                <a:highlight>
-                  <a:srgbClr val="FFFFFF"/>
-                </a:highlight>
-              </a:rPr>
-              <a:t>LaunchActivatedEventArgs</a:t>
-            </a:r>
-            <a:r>
-              <a:rPr lang="en-US" sz="1600" dirty="0">
-                <a:solidFill>
-                  <a:srgbClr val="000000"/>
-                </a:solidFill>
-                <a:highlight>
-                  <a:srgbClr val="FFFFFF"/>
-                </a:highlight>
-              </a:rPr>
-              <a:t> e)</a:t>
-            </a:r>
-          </a:p>
-          <a:p>
-            <a:r>
-              <a:rPr lang="ru-RU" sz="1600" dirty="0" smtClean="0">
-                <a:solidFill>
-                  <a:srgbClr val="000000"/>
-                </a:solidFill>
-                <a:highlight>
-                  <a:srgbClr val="FFFFFF"/>
-                </a:highlight>
-              </a:rPr>
-              <a:t>{ …</a:t>
-            </a:r>
-          </a:p>
-          <a:p>
-            <a:r>
-              <a:rPr lang="en-US" sz="1600" dirty="0">
-                <a:solidFill>
-                  <a:srgbClr val="000000"/>
-                </a:solidFill>
-                <a:highlight>
-                  <a:srgbClr val="FFFFFF"/>
-                </a:highlight>
-              </a:rPr>
-              <a:t> </a:t>
-            </a:r>
-            <a:r>
-              <a:rPr lang="ru-RU" sz="1600" dirty="0" smtClean="0">
-                <a:solidFill>
-                  <a:srgbClr val="000000"/>
-                </a:solidFill>
-                <a:highlight>
-                  <a:srgbClr val="FFFFFF"/>
-                </a:highlight>
-              </a:rPr>
-              <a:t>  </a:t>
-            </a:r>
-            <a:r>
-              <a:rPr lang="en-US" sz="1600" dirty="0" err="1" smtClean="0">
-                <a:solidFill>
-                  <a:srgbClr val="2B91AF"/>
-                </a:solidFill>
-                <a:highlight>
-                  <a:srgbClr val="FFFFFF"/>
-                </a:highlight>
-              </a:rPr>
-              <a:t>SystemNavigationManager</a:t>
-            </a:r>
-            <a:r>
-              <a:rPr lang="en-US" sz="1600" dirty="0" err="1" smtClean="0">
-                <a:solidFill>
-                  <a:srgbClr val="000000"/>
-                </a:solidFill>
-                <a:highlight>
-                  <a:srgbClr val="FFFFFF"/>
-                </a:highlight>
-              </a:rPr>
-              <a:t>.GetForCurrentView</a:t>
-            </a:r>
-            <a:r>
-              <a:rPr lang="en-US" sz="1600" dirty="0">
-                <a:solidFill>
-                  <a:srgbClr val="000000"/>
-                </a:solidFill>
-                <a:highlight>
-                  <a:srgbClr val="FFFFFF"/>
-                </a:highlight>
-              </a:rPr>
-              <a:t>().</a:t>
-            </a:r>
-            <a:r>
-              <a:rPr lang="en-US" sz="1600" dirty="0" err="1">
-                <a:solidFill>
-                  <a:srgbClr val="000000"/>
-                </a:solidFill>
-                <a:highlight>
-                  <a:srgbClr val="FFFFFF"/>
-                </a:highlight>
-              </a:rPr>
-              <a:t>BackRequested</a:t>
-            </a:r>
-            <a:r>
-              <a:rPr lang="en-US" sz="1600" dirty="0">
-                <a:solidFill>
-                  <a:srgbClr val="000000"/>
-                </a:solidFill>
-                <a:highlight>
-                  <a:srgbClr val="FFFFFF"/>
-                </a:highlight>
-              </a:rPr>
-              <a:t> += </a:t>
-            </a:r>
-            <a:endParaRPr lang="ru-RU" sz="1600" dirty="0" smtClean="0">
-              <a:solidFill>
-                <a:srgbClr val="000000"/>
-              </a:solidFill>
-              <a:highlight>
-                <a:srgbClr val="FFFFFF"/>
-              </a:highlight>
-            </a:endParaRPr>
-          </a:p>
-          <a:p>
-            <a:r>
-              <a:rPr lang="ru-RU" sz="1600" dirty="0">
-                <a:solidFill>
-                  <a:srgbClr val="000000"/>
-                </a:solidFill>
-                <a:highlight>
-                  <a:srgbClr val="FFFFFF"/>
-                </a:highlight>
-              </a:rPr>
-              <a:t> </a:t>
-            </a:r>
-            <a:r>
-              <a:rPr lang="ru-RU" sz="1600" dirty="0" smtClean="0">
-                <a:solidFill>
-                  <a:srgbClr val="000000"/>
-                </a:solidFill>
-                <a:highlight>
-                  <a:srgbClr val="FFFFFF"/>
-                </a:highlight>
-              </a:rPr>
-              <a:t>    </a:t>
-            </a:r>
-            <a:r>
-              <a:rPr lang="en-US" sz="1600" dirty="0" err="1" smtClean="0">
-                <a:solidFill>
-                  <a:srgbClr val="000000"/>
-                </a:solidFill>
-                <a:highlight>
-                  <a:srgbClr val="FFFFFF"/>
-                </a:highlight>
-              </a:rPr>
-              <a:t>App_BackRequested</a:t>
-            </a:r>
-            <a:r>
-              <a:rPr lang="en-US" sz="1600" dirty="0" smtClean="0">
-                <a:solidFill>
-                  <a:srgbClr val="000000"/>
-                </a:solidFill>
-                <a:highlight>
-                  <a:srgbClr val="FFFFFF"/>
-                </a:highlight>
-              </a:rPr>
-              <a:t>;</a:t>
-            </a:r>
-            <a:endParaRPr lang="ru-RU" sz="1600" dirty="0" smtClean="0">
-              <a:solidFill>
-                <a:srgbClr val="000000"/>
-              </a:solidFill>
-              <a:highlight>
-                <a:srgbClr val="FFFFFF"/>
-              </a:highlight>
-            </a:endParaRPr>
-          </a:p>
-          <a:p>
-            <a:r>
-              <a:rPr lang="en-US" sz="1600" dirty="0" smtClean="0">
-                <a:solidFill>
-                  <a:srgbClr val="000000"/>
-                </a:solidFill>
-                <a:highlight>
-                  <a:srgbClr val="FFFFFF"/>
-                </a:highlight>
-              </a:rPr>
-              <a:t>}</a:t>
-            </a:r>
-          </a:p>
-          <a:p>
-            <a:endParaRPr lang="en-US" sz="1100" dirty="0" smtClean="0">
-              <a:solidFill>
-                <a:srgbClr val="0000FF"/>
-              </a:solidFill>
-              <a:highlight>
-                <a:srgbClr val="FFFFFF"/>
-              </a:highlight>
-            </a:endParaRPr>
-          </a:p>
-          <a:p>
-            <a:r>
-              <a:rPr lang="en-US" sz="1600" dirty="0">
-                <a:solidFill>
-                  <a:srgbClr val="0000FF"/>
-                </a:solidFill>
-                <a:highlight>
-                  <a:srgbClr val="FFFFFF"/>
-                </a:highlight>
-              </a:rPr>
-              <a:t>private</a:t>
-            </a:r>
-            <a:r>
-              <a:rPr lang="en-US" sz="1600" dirty="0">
-                <a:solidFill>
-                  <a:srgbClr val="000000"/>
-                </a:solidFill>
-                <a:highlight>
-                  <a:srgbClr val="FFFFFF"/>
-                </a:highlight>
-              </a:rPr>
-              <a:t> </a:t>
-            </a:r>
-            <a:r>
-              <a:rPr lang="en-US" sz="1600" dirty="0">
-                <a:solidFill>
-                  <a:srgbClr val="0000FF"/>
-                </a:solidFill>
-                <a:highlight>
-                  <a:srgbClr val="FFFFFF"/>
-                </a:highlight>
-              </a:rPr>
-              <a:t>void</a:t>
-            </a:r>
-            <a:r>
-              <a:rPr lang="en-US" sz="1600" dirty="0">
-                <a:solidFill>
-                  <a:srgbClr val="000000"/>
-                </a:solidFill>
-                <a:highlight>
-                  <a:srgbClr val="FFFFFF"/>
-                </a:highlight>
-              </a:rPr>
-              <a:t> </a:t>
-            </a:r>
-            <a:r>
-              <a:rPr lang="en-US" sz="1600" dirty="0" err="1">
-                <a:solidFill>
-                  <a:srgbClr val="000000"/>
-                </a:solidFill>
-                <a:highlight>
-                  <a:srgbClr val="FFFFFF"/>
-                </a:highlight>
-              </a:rPr>
-              <a:t>App_BackRequested</a:t>
-            </a:r>
-            <a:r>
-              <a:rPr lang="en-US" sz="1600" dirty="0">
-                <a:solidFill>
-                  <a:srgbClr val="000000"/>
-                </a:solidFill>
-                <a:highlight>
-                  <a:srgbClr val="FFFFFF"/>
-                </a:highlight>
-              </a:rPr>
-              <a:t>(</a:t>
-            </a:r>
-            <a:r>
-              <a:rPr lang="en-US" sz="1600" dirty="0">
-                <a:solidFill>
-                  <a:srgbClr val="0000FF"/>
-                </a:solidFill>
-                <a:highlight>
-                  <a:srgbClr val="FFFFFF"/>
-                </a:highlight>
-              </a:rPr>
-              <a:t>object</a:t>
-            </a:r>
-            <a:r>
-              <a:rPr lang="en-US" sz="1600" dirty="0">
-                <a:solidFill>
-                  <a:srgbClr val="000000"/>
-                </a:solidFill>
-                <a:highlight>
-                  <a:srgbClr val="FFFFFF"/>
-                </a:highlight>
-              </a:rPr>
-              <a:t> sender, </a:t>
-            </a:r>
-            <a:endParaRPr lang="ru-RU" sz="1600" dirty="0" smtClean="0">
-              <a:solidFill>
-                <a:srgbClr val="000000"/>
-              </a:solidFill>
-              <a:highlight>
-                <a:srgbClr val="FFFFFF"/>
-              </a:highlight>
-            </a:endParaRPr>
-          </a:p>
-          <a:p>
-            <a:r>
-              <a:rPr lang="ru-RU" sz="1600" dirty="0">
-                <a:solidFill>
-                  <a:srgbClr val="000000"/>
-                </a:solidFill>
-                <a:highlight>
-                  <a:srgbClr val="FFFFFF"/>
-                </a:highlight>
-              </a:rPr>
-              <a:t> </a:t>
-            </a:r>
-            <a:r>
-              <a:rPr lang="ru-RU" sz="1600" dirty="0" smtClean="0">
-                <a:solidFill>
-                  <a:srgbClr val="000000"/>
-                </a:solidFill>
-                <a:highlight>
-                  <a:srgbClr val="FFFFFF"/>
-                </a:highlight>
-              </a:rPr>
-              <a:t>                       </a:t>
-            </a:r>
-            <a:r>
-              <a:rPr lang="en-US" sz="1600" dirty="0" err="1" smtClean="0">
-                <a:solidFill>
-                  <a:srgbClr val="2B91AF"/>
-                </a:solidFill>
-                <a:highlight>
-                  <a:srgbClr val="FFFFFF"/>
-                </a:highlight>
-              </a:rPr>
-              <a:t>BackRequestedEventArgs</a:t>
-            </a:r>
-            <a:r>
-              <a:rPr lang="en-US" sz="1600" dirty="0" smtClean="0">
-                <a:solidFill>
-                  <a:srgbClr val="000000"/>
-                </a:solidFill>
-                <a:highlight>
-                  <a:srgbClr val="FFFFFF"/>
-                </a:highlight>
-              </a:rPr>
-              <a:t> </a:t>
-            </a:r>
-            <a:r>
-              <a:rPr lang="en-US" sz="1600" dirty="0">
-                <a:solidFill>
-                  <a:srgbClr val="000000"/>
-                </a:solidFill>
-                <a:highlight>
-                  <a:srgbClr val="FFFFFF"/>
-                </a:highlight>
-              </a:rPr>
-              <a:t>e)</a:t>
-            </a:r>
-          </a:p>
-          <a:p>
-            <a:r>
-              <a:rPr lang="ru-RU" sz="1600" dirty="0">
-                <a:solidFill>
-                  <a:srgbClr val="000000"/>
-                </a:solidFill>
-                <a:highlight>
-                  <a:srgbClr val="FFFFFF"/>
-                </a:highlight>
-              </a:rPr>
-              <a:t>{</a:t>
-            </a:r>
-          </a:p>
-          <a:p>
-            <a:r>
-              <a:rPr lang="ru-RU" sz="1600" dirty="0" smtClean="0">
-                <a:solidFill>
-                  <a:srgbClr val="0000FF"/>
-                </a:solidFill>
-                <a:highlight>
-                  <a:srgbClr val="FFFFFF"/>
-                </a:highlight>
-              </a:rPr>
-              <a:t>    </a:t>
-            </a:r>
-            <a:r>
-              <a:rPr lang="en-US" sz="1600" dirty="0" smtClean="0">
-                <a:solidFill>
-                  <a:srgbClr val="0000FF"/>
-                </a:solidFill>
-                <a:highlight>
-                  <a:srgbClr val="FFFFFF"/>
-                </a:highlight>
-              </a:rPr>
-              <a:t>if</a:t>
-            </a:r>
-            <a:r>
-              <a:rPr lang="en-US" sz="1600" dirty="0" smtClean="0">
-                <a:solidFill>
-                  <a:srgbClr val="000000"/>
-                </a:solidFill>
-                <a:highlight>
-                  <a:srgbClr val="FFFFFF"/>
-                </a:highlight>
-              </a:rPr>
-              <a:t> </a:t>
-            </a:r>
-            <a:r>
-              <a:rPr lang="en-US" sz="1600" dirty="0">
-                <a:solidFill>
-                  <a:srgbClr val="000000"/>
-                </a:solidFill>
-                <a:highlight>
-                  <a:srgbClr val="FFFFFF"/>
-                </a:highlight>
-              </a:rPr>
-              <a:t>(!</a:t>
-            </a:r>
-            <a:r>
-              <a:rPr lang="en-US" sz="1600" dirty="0" err="1">
-                <a:solidFill>
-                  <a:srgbClr val="000000"/>
-                </a:solidFill>
-                <a:highlight>
-                  <a:srgbClr val="FFFFFF"/>
-                </a:highlight>
-              </a:rPr>
-              <a:t>e.Handled</a:t>
-            </a:r>
-            <a:r>
-              <a:rPr lang="en-US" sz="1600" dirty="0" smtClean="0">
-                <a:solidFill>
-                  <a:srgbClr val="000000"/>
-                </a:solidFill>
-                <a:highlight>
-                  <a:srgbClr val="FFFFFF"/>
-                </a:highlight>
-              </a:rPr>
-              <a:t>)</a:t>
-            </a:r>
-            <a:r>
-              <a:rPr lang="ru-RU" sz="1600" dirty="0" smtClean="0">
-                <a:solidFill>
-                  <a:srgbClr val="000000"/>
-                </a:solidFill>
-                <a:highlight>
-                  <a:srgbClr val="FFFFFF"/>
-                </a:highlight>
-              </a:rPr>
-              <a:t> {</a:t>
-            </a:r>
-            <a:endParaRPr lang="ru-RU" sz="1600" dirty="0">
-              <a:solidFill>
-                <a:srgbClr val="000000"/>
-              </a:solidFill>
-              <a:highlight>
-                <a:srgbClr val="FFFFFF"/>
-              </a:highlight>
-            </a:endParaRPr>
-          </a:p>
-          <a:p>
-            <a:r>
-              <a:rPr lang="ru-RU" sz="1600" dirty="0" smtClean="0">
-                <a:solidFill>
-                  <a:srgbClr val="2B91AF"/>
-                </a:solidFill>
-                <a:highlight>
-                  <a:srgbClr val="FFFFFF"/>
-                </a:highlight>
-              </a:rPr>
-              <a:t>        </a:t>
-            </a:r>
-            <a:r>
-              <a:rPr lang="en-US" sz="1600" dirty="0" smtClean="0">
-                <a:solidFill>
-                  <a:srgbClr val="2B91AF"/>
-                </a:solidFill>
-                <a:highlight>
-                  <a:srgbClr val="FFFFFF"/>
-                </a:highlight>
-              </a:rPr>
-              <a:t>Frame</a:t>
-            </a:r>
-            <a:r>
-              <a:rPr lang="en-US" sz="1600" dirty="0" smtClean="0">
-                <a:solidFill>
-                  <a:srgbClr val="000000"/>
-                </a:solidFill>
-                <a:highlight>
-                  <a:srgbClr val="FFFFFF"/>
-                </a:highlight>
-              </a:rPr>
-              <a:t> </a:t>
-            </a:r>
-            <a:r>
-              <a:rPr lang="en-US" sz="1600" dirty="0" err="1">
-                <a:solidFill>
-                  <a:srgbClr val="000000"/>
-                </a:solidFill>
-                <a:highlight>
-                  <a:srgbClr val="FFFFFF"/>
-                </a:highlight>
-              </a:rPr>
-              <a:t>frame</a:t>
-            </a:r>
-            <a:r>
-              <a:rPr lang="en-US" sz="1600" dirty="0">
-                <a:solidFill>
-                  <a:srgbClr val="000000"/>
-                </a:solidFill>
-                <a:highlight>
-                  <a:srgbClr val="FFFFFF"/>
-                </a:highlight>
-              </a:rPr>
-              <a:t> = </a:t>
-            </a:r>
-            <a:r>
-              <a:rPr lang="en-US" sz="1600" dirty="0" err="1">
-                <a:solidFill>
-                  <a:srgbClr val="2B91AF"/>
-                </a:solidFill>
-                <a:highlight>
-                  <a:srgbClr val="FFFFFF"/>
-                </a:highlight>
-              </a:rPr>
-              <a:t>Window</a:t>
-            </a:r>
-            <a:r>
-              <a:rPr lang="en-US" sz="1600" dirty="0" err="1">
-                <a:solidFill>
-                  <a:srgbClr val="000000"/>
-                </a:solidFill>
-                <a:highlight>
-                  <a:srgbClr val="FFFFFF"/>
-                </a:highlight>
-              </a:rPr>
-              <a:t>.Current.Content</a:t>
-            </a:r>
-            <a:r>
-              <a:rPr lang="en-US" sz="1600" dirty="0">
-                <a:solidFill>
-                  <a:srgbClr val="000000"/>
-                </a:solidFill>
-                <a:highlight>
-                  <a:srgbClr val="FFFFFF"/>
-                </a:highlight>
-              </a:rPr>
-              <a:t> </a:t>
-            </a:r>
-            <a:r>
-              <a:rPr lang="en-US" sz="1600" dirty="0">
-                <a:solidFill>
-                  <a:srgbClr val="0000FF"/>
-                </a:solidFill>
-                <a:highlight>
-                  <a:srgbClr val="FFFFFF"/>
-                </a:highlight>
-              </a:rPr>
-              <a:t>as</a:t>
-            </a:r>
-            <a:r>
-              <a:rPr lang="en-US" sz="1600" dirty="0">
-                <a:solidFill>
-                  <a:srgbClr val="000000"/>
-                </a:solidFill>
-                <a:highlight>
-                  <a:srgbClr val="FFFFFF"/>
-                </a:highlight>
-              </a:rPr>
-              <a:t> </a:t>
-            </a:r>
-            <a:r>
-              <a:rPr lang="en-US" sz="1600" dirty="0">
-                <a:solidFill>
-                  <a:srgbClr val="2B91AF"/>
-                </a:solidFill>
-                <a:highlight>
-                  <a:srgbClr val="FFFFFF"/>
-                </a:highlight>
-              </a:rPr>
-              <a:t>Frame</a:t>
-            </a:r>
-            <a:r>
-              <a:rPr lang="en-US" sz="1600" dirty="0">
-                <a:solidFill>
-                  <a:srgbClr val="000000"/>
-                </a:solidFill>
-                <a:highlight>
-                  <a:srgbClr val="FFFFFF"/>
-                </a:highlight>
-              </a:rPr>
-              <a:t>;</a:t>
-            </a:r>
-          </a:p>
-          <a:p>
-            <a:r>
-              <a:rPr lang="en-US" sz="1600" dirty="0">
-                <a:solidFill>
-                  <a:srgbClr val="000000"/>
-                </a:solidFill>
-                <a:highlight>
-                  <a:srgbClr val="FFFFFF"/>
-                </a:highlight>
-              </a:rPr>
-              <a:t>        </a:t>
-            </a:r>
-            <a:r>
-              <a:rPr lang="en-US" sz="1600" dirty="0">
-                <a:solidFill>
-                  <a:srgbClr val="0000FF"/>
-                </a:solidFill>
-                <a:highlight>
-                  <a:srgbClr val="FFFFFF"/>
-                </a:highlight>
-              </a:rPr>
-              <a:t>if</a:t>
-            </a:r>
-            <a:r>
-              <a:rPr lang="en-US" sz="1600" dirty="0">
-                <a:solidFill>
-                  <a:srgbClr val="000000"/>
-                </a:solidFill>
-                <a:highlight>
-                  <a:srgbClr val="FFFFFF"/>
-                </a:highlight>
-              </a:rPr>
-              <a:t> (</a:t>
-            </a:r>
-            <a:r>
-              <a:rPr lang="en-US" sz="1600" dirty="0" err="1">
-                <a:solidFill>
-                  <a:srgbClr val="000000"/>
-                </a:solidFill>
-                <a:highlight>
-                  <a:srgbClr val="FFFFFF"/>
-                </a:highlight>
-              </a:rPr>
-              <a:t>frame.CanGoBack</a:t>
-            </a:r>
-            <a:r>
-              <a:rPr lang="en-US" sz="1600" dirty="0" smtClean="0">
-                <a:solidFill>
-                  <a:srgbClr val="000000"/>
-                </a:solidFill>
-                <a:highlight>
-                  <a:srgbClr val="FFFFFF"/>
-                </a:highlight>
-              </a:rPr>
-              <a:t>)</a:t>
-            </a:r>
-            <a:r>
-              <a:rPr lang="ru-RU" sz="1600" dirty="0" smtClean="0">
-                <a:solidFill>
-                  <a:srgbClr val="000000"/>
-                </a:solidFill>
-                <a:highlight>
-                  <a:srgbClr val="FFFFFF"/>
-                </a:highlight>
-              </a:rPr>
-              <a:t> {</a:t>
-            </a:r>
-            <a:endParaRPr lang="ru-RU" sz="1600" dirty="0">
-              <a:solidFill>
-                <a:srgbClr val="000000"/>
-              </a:solidFill>
-              <a:highlight>
-                <a:srgbClr val="FFFFFF"/>
-              </a:highlight>
-            </a:endParaRPr>
-          </a:p>
-          <a:p>
-            <a:r>
-              <a:rPr lang="en-US" sz="1600" dirty="0">
-                <a:solidFill>
-                  <a:srgbClr val="000000"/>
-                </a:solidFill>
-                <a:highlight>
-                  <a:srgbClr val="FFFFFF"/>
-                </a:highlight>
-              </a:rPr>
-              <a:t>            </a:t>
-            </a:r>
-            <a:r>
-              <a:rPr lang="en-US" sz="1600" dirty="0" err="1">
-                <a:solidFill>
-                  <a:srgbClr val="000000"/>
-                </a:solidFill>
-                <a:highlight>
-                  <a:srgbClr val="FFFFFF"/>
-                </a:highlight>
-              </a:rPr>
-              <a:t>frame.GoBack</a:t>
-            </a:r>
-            <a:r>
-              <a:rPr lang="en-US" sz="1600" dirty="0">
-                <a:solidFill>
-                  <a:srgbClr val="000000"/>
-                </a:solidFill>
-                <a:highlight>
-                  <a:srgbClr val="FFFFFF"/>
-                </a:highlight>
-              </a:rPr>
-              <a:t>();</a:t>
-            </a:r>
-          </a:p>
-          <a:p>
-            <a:r>
-              <a:rPr lang="ru-RU" sz="1600" dirty="0" smtClean="0">
-                <a:solidFill>
-                  <a:srgbClr val="000000"/>
-                </a:solidFill>
-                <a:highlight>
-                  <a:srgbClr val="FFFFFF"/>
-                </a:highlight>
-              </a:rPr>
-              <a:t>            </a:t>
-            </a:r>
-            <a:r>
-              <a:rPr lang="en-US" sz="1600" dirty="0" err="1" smtClean="0">
-                <a:solidFill>
-                  <a:srgbClr val="000000"/>
-                </a:solidFill>
-                <a:highlight>
-                  <a:srgbClr val="FFFFFF"/>
-                </a:highlight>
-              </a:rPr>
-              <a:t>e.Handled</a:t>
-            </a:r>
-            <a:r>
-              <a:rPr lang="en-US" sz="1600" dirty="0" smtClean="0">
-                <a:solidFill>
-                  <a:srgbClr val="000000"/>
-                </a:solidFill>
-                <a:highlight>
-                  <a:srgbClr val="FFFFFF"/>
-                </a:highlight>
-              </a:rPr>
-              <a:t> </a:t>
-            </a:r>
-            <a:r>
-              <a:rPr lang="en-US" sz="1600" dirty="0">
-                <a:solidFill>
-                  <a:srgbClr val="000000"/>
-                </a:solidFill>
-                <a:highlight>
-                  <a:srgbClr val="FFFFFF"/>
-                </a:highlight>
-              </a:rPr>
-              <a:t>= </a:t>
-            </a:r>
-            <a:r>
-              <a:rPr lang="en-US" sz="1600" dirty="0">
-                <a:solidFill>
-                  <a:srgbClr val="0000FF"/>
-                </a:solidFill>
-                <a:highlight>
-                  <a:srgbClr val="FFFFFF"/>
-                </a:highlight>
-              </a:rPr>
-              <a:t>true</a:t>
-            </a:r>
-            <a:r>
-              <a:rPr lang="en-US" sz="1600" dirty="0">
-                <a:solidFill>
-                  <a:srgbClr val="000000"/>
-                </a:solidFill>
-                <a:highlight>
-                  <a:srgbClr val="FFFFFF"/>
-                </a:highlight>
-              </a:rPr>
-              <a:t>;</a:t>
-            </a:r>
-          </a:p>
-          <a:p>
-            <a:r>
-              <a:rPr lang="ru-RU" sz="1600" dirty="0">
-                <a:solidFill>
-                  <a:srgbClr val="000000"/>
-                </a:solidFill>
-                <a:highlight>
-                  <a:srgbClr val="FFFFFF"/>
-                </a:highlight>
-              </a:rPr>
-              <a:t>        }</a:t>
-            </a:r>
-          </a:p>
-          <a:p>
-            <a:r>
-              <a:rPr lang="ru-RU" sz="1600" dirty="0">
-                <a:solidFill>
-                  <a:srgbClr val="000000"/>
-                </a:solidFill>
-                <a:highlight>
-                  <a:srgbClr val="FFFFFF"/>
-                </a:highlight>
-              </a:rPr>
-              <a:t>    }</a:t>
-            </a:r>
-          </a:p>
-          <a:p>
-            <a:r>
-              <a:rPr lang="ru-RU" sz="1600" dirty="0">
-                <a:solidFill>
-                  <a:srgbClr val="000000"/>
-                </a:solidFill>
-                <a:highlight>
-                  <a:srgbClr val="FFFFFF"/>
-                </a:highlight>
-              </a:rPr>
-              <a:t>}</a:t>
-            </a:r>
-          </a:p>
-        </p:txBody>
-      </p:sp>
-      <p:sp>
-        <p:nvSpPr>
-          <p:cNvPr id="5" name="TextBox 4"/>
-          <p:cNvSpPr txBox="1"/>
-          <p:nvPr/>
-        </p:nvSpPr>
-        <p:spPr>
-          <a:xfrm>
-            <a:off x="516000" y="1089000"/>
-            <a:ext cx="7190776" cy="830997"/>
-          </a:xfrm>
-          <a:prstGeom prst="rect">
-            <a:avLst/>
-          </a:prstGeom>
-          <a:noFill/>
-        </p:spPr>
-        <p:txBody>
-          <a:bodyPr wrap="square" rtlCol="0">
-            <a:spAutoFit/>
-          </a:bodyPr>
-          <a:lstStyle/>
-          <a:p>
-            <a:r>
-              <a:rPr lang="ru-RU" sz="2400" dirty="0">
-                <a:latin typeface="+mj-lt"/>
-              </a:rPr>
-              <a:t>Л</a:t>
-            </a:r>
-            <a:r>
-              <a:rPr lang="ru-RU" sz="2400" dirty="0" smtClean="0">
-                <a:latin typeface="+mj-lt"/>
-              </a:rPr>
-              <a:t>огику обратной навигации можно разместить в </a:t>
-            </a:r>
-            <a:r>
-              <a:rPr lang="en-US" sz="2400" b="1" dirty="0" err="1" smtClean="0"/>
-              <a:t>App.xaml.cs</a:t>
-            </a:r>
-            <a:r>
-              <a:rPr lang="ru-RU" sz="2400" dirty="0">
-                <a:latin typeface="+mj-lt"/>
-              </a:rPr>
-              <a:t>:</a:t>
-            </a:r>
+              <a:rPr lang="ru-RU" dirty="0" smtClean="0"/>
+              <a:t>Нажатие кнопки </a:t>
+            </a:r>
+            <a:r>
+              <a:rPr lang="en-US" dirty="0" smtClean="0"/>
+              <a:t>back </a:t>
+            </a:r>
+            <a:r>
+              <a:rPr lang="ru-RU" dirty="0" smtClean="0"/>
+              <a:t>перемещает нас на предыдущую страницу в стеке навигации, затем на предыдущее приложение</a:t>
+            </a:r>
+            <a:endParaRPr lang="en-US" dirty="0" smtClean="0"/>
+          </a:p>
+          <a:p>
+            <a:pPr lvl="1"/>
+            <a:r>
+              <a:rPr lang="ru-RU" dirty="0" smtClean="0"/>
+              <a:t>Та же логика, что в </a:t>
+            </a:r>
+            <a:r>
+              <a:rPr lang="en-US" dirty="0" smtClean="0"/>
+              <a:t>Windows Phone </a:t>
+            </a:r>
+            <a:r>
+              <a:rPr lang="en-US" dirty="0"/>
+              <a:t>8.1</a:t>
+            </a:r>
+          </a:p>
+          <a:p>
+            <a:r>
+              <a:rPr lang="ru-RU" dirty="0" smtClean="0"/>
+              <a:t>Уход из приложения по </a:t>
+            </a:r>
+            <a:r>
+              <a:rPr lang="en-US" dirty="0" smtClean="0"/>
+              <a:t>back </a:t>
+            </a:r>
+            <a:r>
+              <a:rPr lang="ru-RU" dirty="0" smtClean="0"/>
+              <a:t>не закрывает его, а приостанавливает</a:t>
+            </a:r>
+            <a:endParaRPr lang="en-US" dirty="0" smtClean="0"/>
+          </a:p>
+          <a:p>
+            <a:r>
+              <a:rPr lang="ru-RU" dirty="0" smtClean="0"/>
+              <a:t>Для планшетов в </a:t>
+            </a:r>
+            <a:r>
+              <a:rPr lang="en-US" dirty="0" smtClean="0"/>
+              <a:t>split screen </a:t>
+            </a:r>
+            <a:r>
+              <a:rPr lang="ru-RU" dirty="0" smtClean="0"/>
+              <a:t>поддерживается два стека навигации</a:t>
+            </a:r>
+            <a:endParaRPr lang="en-US" dirty="0" smtClean="0"/>
+          </a:p>
+          <a:p>
+            <a:pPr lvl="1"/>
+            <a:endParaRPr lang="en-US" dirty="0" smtClean="0"/>
+          </a:p>
+          <a:p>
+            <a:endParaRPr lang="en-US" dirty="0"/>
           </a:p>
         </p:txBody>
       </p:sp>
     </p:spTree>
     <p:extLst>
       <p:ext uri="{BB962C8B-B14F-4D97-AF65-F5344CB8AC3E}">
-        <p14:creationId xmlns:p14="http://schemas.microsoft.com/office/powerpoint/2010/main" val="1271477299"/>
+        <p14:creationId xmlns:p14="http://schemas.microsoft.com/office/powerpoint/2010/main" val="206534015"/>
       </p:ext>
     </p:extLst>
   </p:cSld>
@@ -28187,6 +27302,1038 @@
         </p:nvSpPr>
         <p:spPr>
           <a:xfrm>
+            <a:off x="516000" y="369000"/>
+            <a:ext cx="10837800" cy="720000"/>
+          </a:xfrm>
+        </p:spPr>
+        <p:txBody>
+          <a:bodyPr/>
+          <a:lstStyle/>
+          <a:p>
+            <a:r>
+              <a:rPr lang="ru-RU" dirty="0" smtClean="0"/>
+              <a:t>Обработка перехода назад</a:t>
+            </a:r>
+            <a:endParaRPr lang="ru-RU" dirty="0"/>
+          </a:p>
+        </p:txBody>
+      </p:sp>
+      <p:sp>
+        <p:nvSpPr>
+          <p:cNvPr id="4" name="Объект 3"/>
+          <p:cNvSpPr>
+            <a:spLocks noGrp="1"/>
+          </p:cNvSpPr>
+          <p:nvPr>
+            <p:ph idx="1"/>
+          </p:nvPr>
+        </p:nvSpPr>
+        <p:spPr>
+          <a:xfrm>
+            <a:off x="525224" y="2169000"/>
+            <a:ext cx="7370776" cy="4500000"/>
+          </a:xfrm>
+        </p:spPr>
+        <p:txBody>
+          <a:bodyPr>
+            <a:normAutofit fontScale="92500" lnSpcReduction="10000"/>
+          </a:bodyPr>
+          <a:lstStyle/>
+          <a:p>
+            <a:r>
+              <a:rPr lang="en-US" sz="1600" dirty="0" smtClean="0">
+                <a:solidFill>
+                  <a:srgbClr val="0000FF"/>
+                </a:solidFill>
+                <a:highlight>
+                  <a:srgbClr val="FFFFFF"/>
+                </a:highlight>
+              </a:rPr>
+              <a:t>protected</a:t>
+            </a:r>
+            <a:r>
+              <a:rPr lang="en-US" sz="1600" dirty="0" smtClean="0">
+                <a:solidFill>
+                  <a:srgbClr val="000000"/>
+                </a:solidFill>
+                <a:highlight>
+                  <a:srgbClr val="FFFFFF"/>
+                </a:highlight>
+              </a:rPr>
+              <a:t> </a:t>
+            </a:r>
+            <a:r>
+              <a:rPr lang="en-US" sz="1600" dirty="0">
+                <a:solidFill>
+                  <a:srgbClr val="0000FF"/>
+                </a:solidFill>
+                <a:highlight>
+                  <a:srgbClr val="FFFFFF"/>
+                </a:highlight>
+              </a:rPr>
+              <a:t>override</a:t>
+            </a:r>
+            <a:r>
+              <a:rPr lang="en-US" sz="1600" dirty="0">
+                <a:solidFill>
+                  <a:srgbClr val="000000"/>
+                </a:solidFill>
+                <a:highlight>
+                  <a:srgbClr val="FFFFFF"/>
+                </a:highlight>
+              </a:rPr>
+              <a:t> </a:t>
+            </a:r>
+            <a:r>
+              <a:rPr lang="en-US" sz="1600" dirty="0">
+                <a:solidFill>
+                  <a:srgbClr val="0000FF"/>
+                </a:solidFill>
+                <a:highlight>
+                  <a:srgbClr val="FFFFFF"/>
+                </a:highlight>
+              </a:rPr>
+              <a:t>void</a:t>
+            </a:r>
+            <a:r>
+              <a:rPr lang="en-US" sz="1600" dirty="0">
+                <a:solidFill>
+                  <a:srgbClr val="000000"/>
+                </a:solidFill>
+                <a:highlight>
+                  <a:srgbClr val="FFFFFF"/>
+                </a:highlight>
+              </a:rPr>
+              <a:t> </a:t>
+            </a:r>
+            <a:r>
+              <a:rPr lang="en-US" sz="1600" dirty="0" err="1">
+                <a:solidFill>
+                  <a:srgbClr val="000000"/>
+                </a:solidFill>
+                <a:highlight>
+                  <a:srgbClr val="FFFFFF"/>
+                </a:highlight>
+              </a:rPr>
+              <a:t>OnLaunched</a:t>
+            </a:r>
+            <a:r>
+              <a:rPr lang="en-US" sz="1600" dirty="0">
+                <a:solidFill>
+                  <a:srgbClr val="000000"/>
+                </a:solidFill>
+                <a:highlight>
+                  <a:srgbClr val="FFFFFF"/>
+                </a:highlight>
+              </a:rPr>
+              <a:t>(</a:t>
+            </a:r>
+            <a:r>
+              <a:rPr lang="en-US" sz="1600" dirty="0" err="1">
+                <a:solidFill>
+                  <a:srgbClr val="2B91AF"/>
+                </a:solidFill>
+                <a:highlight>
+                  <a:srgbClr val="FFFFFF"/>
+                </a:highlight>
+              </a:rPr>
+              <a:t>LaunchActivatedEventArgs</a:t>
+            </a:r>
+            <a:r>
+              <a:rPr lang="en-US" sz="1600" dirty="0">
+                <a:solidFill>
+                  <a:srgbClr val="000000"/>
+                </a:solidFill>
+                <a:highlight>
+                  <a:srgbClr val="FFFFFF"/>
+                </a:highlight>
+              </a:rPr>
+              <a:t> e)</a:t>
+            </a:r>
+          </a:p>
+          <a:p>
+            <a:r>
+              <a:rPr lang="ru-RU" sz="1600" dirty="0" smtClean="0">
+                <a:solidFill>
+                  <a:srgbClr val="000000"/>
+                </a:solidFill>
+                <a:highlight>
+                  <a:srgbClr val="FFFFFF"/>
+                </a:highlight>
+              </a:rPr>
+              <a:t>{ …</a:t>
+            </a:r>
+          </a:p>
+          <a:p>
+            <a:r>
+              <a:rPr lang="en-US" sz="1600" dirty="0">
+                <a:solidFill>
+                  <a:srgbClr val="000000"/>
+                </a:solidFill>
+                <a:highlight>
+                  <a:srgbClr val="FFFFFF"/>
+                </a:highlight>
+              </a:rPr>
+              <a:t> </a:t>
+            </a:r>
+            <a:r>
+              <a:rPr lang="ru-RU" sz="1600" dirty="0" smtClean="0">
+                <a:solidFill>
+                  <a:srgbClr val="000000"/>
+                </a:solidFill>
+                <a:highlight>
+                  <a:srgbClr val="FFFFFF"/>
+                </a:highlight>
+              </a:rPr>
+              <a:t>  </a:t>
+            </a:r>
+            <a:r>
+              <a:rPr lang="en-US" sz="1600" dirty="0" err="1" smtClean="0">
+                <a:solidFill>
+                  <a:srgbClr val="2B91AF"/>
+                </a:solidFill>
+                <a:highlight>
+                  <a:srgbClr val="FFFFFF"/>
+                </a:highlight>
+              </a:rPr>
+              <a:t>SystemNavigationManager</a:t>
+            </a:r>
+            <a:r>
+              <a:rPr lang="en-US" sz="1600" dirty="0" err="1" smtClean="0">
+                <a:solidFill>
+                  <a:srgbClr val="000000"/>
+                </a:solidFill>
+                <a:highlight>
+                  <a:srgbClr val="FFFFFF"/>
+                </a:highlight>
+              </a:rPr>
+              <a:t>.GetForCurrentView</a:t>
+            </a:r>
+            <a:r>
+              <a:rPr lang="en-US" sz="1600" dirty="0">
+                <a:solidFill>
+                  <a:srgbClr val="000000"/>
+                </a:solidFill>
+                <a:highlight>
+                  <a:srgbClr val="FFFFFF"/>
+                </a:highlight>
+              </a:rPr>
+              <a:t>().</a:t>
+            </a:r>
+            <a:r>
+              <a:rPr lang="en-US" sz="1600" dirty="0" err="1">
+                <a:solidFill>
+                  <a:srgbClr val="000000"/>
+                </a:solidFill>
+                <a:highlight>
+                  <a:srgbClr val="FFFFFF"/>
+                </a:highlight>
+              </a:rPr>
+              <a:t>BackRequested</a:t>
+            </a:r>
+            <a:r>
+              <a:rPr lang="en-US" sz="1600" dirty="0">
+                <a:solidFill>
+                  <a:srgbClr val="000000"/>
+                </a:solidFill>
+                <a:highlight>
+                  <a:srgbClr val="FFFFFF"/>
+                </a:highlight>
+              </a:rPr>
+              <a:t> += </a:t>
+            </a:r>
+            <a:endParaRPr lang="ru-RU" sz="1600" dirty="0" smtClean="0">
+              <a:solidFill>
+                <a:srgbClr val="000000"/>
+              </a:solidFill>
+              <a:highlight>
+                <a:srgbClr val="FFFFFF"/>
+              </a:highlight>
+            </a:endParaRPr>
+          </a:p>
+          <a:p>
+            <a:r>
+              <a:rPr lang="ru-RU" sz="1600" dirty="0">
+                <a:solidFill>
+                  <a:srgbClr val="000000"/>
+                </a:solidFill>
+                <a:highlight>
+                  <a:srgbClr val="FFFFFF"/>
+                </a:highlight>
+              </a:rPr>
+              <a:t> </a:t>
+            </a:r>
+            <a:r>
+              <a:rPr lang="ru-RU" sz="1600" dirty="0" smtClean="0">
+                <a:solidFill>
+                  <a:srgbClr val="000000"/>
+                </a:solidFill>
+                <a:highlight>
+                  <a:srgbClr val="FFFFFF"/>
+                </a:highlight>
+              </a:rPr>
+              <a:t>    </a:t>
+            </a:r>
+            <a:r>
+              <a:rPr lang="en-US" sz="1600" dirty="0" err="1" smtClean="0">
+                <a:solidFill>
+                  <a:srgbClr val="000000"/>
+                </a:solidFill>
+                <a:highlight>
+                  <a:srgbClr val="FFFFFF"/>
+                </a:highlight>
+              </a:rPr>
+              <a:t>App_BackRequested</a:t>
+            </a:r>
+            <a:r>
+              <a:rPr lang="en-US" sz="1600" dirty="0" smtClean="0">
+                <a:solidFill>
+                  <a:srgbClr val="000000"/>
+                </a:solidFill>
+                <a:highlight>
+                  <a:srgbClr val="FFFFFF"/>
+                </a:highlight>
+              </a:rPr>
+              <a:t>;</a:t>
+            </a:r>
+            <a:endParaRPr lang="ru-RU" sz="1600" dirty="0" smtClean="0">
+              <a:solidFill>
+                <a:srgbClr val="000000"/>
+              </a:solidFill>
+              <a:highlight>
+                <a:srgbClr val="FFFFFF"/>
+              </a:highlight>
+            </a:endParaRPr>
+          </a:p>
+          <a:p>
+            <a:r>
+              <a:rPr lang="en-US" sz="1600" dirty="0" smtClean="0">
+                <a:solidFill>
+                  <a:srgbClr val="000000"/>
+                </a:solidFill>
+                <a:highlight>
+                  <a:srgbClr val="FFFFFF"/>
+                </a:highlight>
+              </a:rPr>
+              <a:t>}</a:t>
+            </a:r>
+          </a:p>
+          <a:p>
+            <a:endParaRPr lang="en-US" sz="1100" dirty="0" smtClean="0">
+              <a:solidFill>
+                <a:srgbClr val="0000FF"/>
+              </a:solidFill>
+              <a:highlight>
+                <a:srgbClr val="FFFFFF"/>
+              </a:highlight>
+            </a:endParaRPr>
+          </a:p>
+          <a:p>
+            <a:r>
+              <a:rPr lang="en-US" sz="1600" dirty="0">
+                <a:solidFill>
+                  <a:srgbClr val="0000FF"/>
+                </a:solidFill>
+                <a:highlight>
+                  <a:srgbClr val="FFFFFF"/>
+                </a:highlight>
+              </a:rPr>
+              <a:t>private</a:t>
+            </a:r>
+            <a:r>
+              <a:rPr lang="en-US" sz="1600" dirty="0">
+                <a:solidFill>
+                  <a:srgbClr val="000000"/>
+                </a:solidFill>
+                <a:highlight>
+                  <a:srgbClr val="FFFFFF"/>
+                </a:highlight>
+              </a:rPr>
+              <a:t> </a:t>
+            </a:r>
+            <a:r>
+              <a:rPr lang="en-US" sz="1600" dirty="0">
+                <a:solidFill>
+                  <a:srgbClr val="0000FF"/>
+                </a:solidFill>
+                <a:highlight>
+                  <a:srgbClr val="FFFFFF"/>
+                </a:highlight>
+              </a:rPr>
+              <a:t>void</a:t>
+            </a:r>
+            <a:r>
+              <a:rPr lang="en-US" sz="1600" dirty="0">
+                <a:solidFill>
+                  <a:srgbClr val="000000"/>
+                </a:solidFill>
+                <a:highlight>
+                  <a:srgbClr val="FFFFFF"/>
+                </a:highlight>
+              </a:rPr>
+              <a:t> </a:t>
+            </a:r>
+            <a:r>
+              <a:rPr lang="en-US" sz="1600" dirty="0" err="1">
+                <a:solidFill>
+                  <a:srgbClr val="000000"/>
+                </a:solidFill>
+                <a:highlight>
+                  <a:srgbClr val="FFFFFF"/>
+                </a:highlight>
+              </a:rPr>
+              <a:t>App_BackRequested</a:t>
+            </a:r>
+            <a:r>
+              <a:rPr lang="en-US" sz="1600" dirty="0">
+                <a:solidFill>
+                  <a:srgbClr val="000000"/>
+                </a:solidFill>
+                <a:highlight>
+                  <a:srgbClr val="FFFFFF"/>
+                </a:highlight>
+              </a:rPr>
+              <a:t>(</a:t>
+            </a:r>
+            <a:r>
+              <a:rPr lang="en-US" sz="1600" dirty="0">
+                <a:solidFill>
+                  <a:srgbClr val="0000FF"/>
+                </a:solidFill>
+                <a:highlight>
+                  <a:srgbClr val="FFFFFF"/>
+                </a:highlight>
+              </a:rPr>
+              <a:t>object</a:t>
+            </a:r>
+            <a:r>
+              <a:rPr lang="en-US" sz="1600" dirty="0">
+                <a:solidFill>
+                  <a:srgbClr val="000000"/>
+                </a:solidFill>
+                <a:highlight>
+                  <a:srgbClr val="FFFFFF"/>
+                </a:highlight>
+              </a:rPr>
+              <a:t> sender, </a:t>
+            </a:r>
+            <a:endParaRPr lang="ru-RU" sz="1600" dirty="0" smtClean="0">
+              <a:solidFill>
+                <a:srgbClr val="000000"/>
+              </a:solidFill>
+              <a:highlight>
+                <a:srgbClr val="FFFFFF"/>
+              </a:highlight>
+            </a:endParaRPr>
+          </a:p>
+          <a:p>
+            <a:r>
+              <a:rPr lang="ru-RU" sz="1600" dirty="0">
+                <a:solidFill>
+                  <a:srgbClr val="000000"/>
+                </a:solidFill>
+                <a:highlight>
+                  <a:srgbClr val="FFFFFF"/>
+                </a:highlight>
+              </a:rPr>
+              <a:t> </a:t>
+            </a:r>
+            <a:r>
+              <a:rPr lang="ru-RU" sz="1600" dirty="0" smtClean="0">
+                <a:solidFill>
+                  <a:srgbClr val="000000"/>
+                </a:solidFill>
+                <a:highlight>
+                  <a:srgbClr val="FFFFFF"/>
+                </a:highlight>
+              </a:rPr>
+              <a:t>                       </a:t>
+            </a:r>
+            <a:r>
+              <a:rPr lang="en-US" sz="1600" dirty="0" err="1" smtClean="0">
+                <a:solidFill>
+                  <a:srgbClr val="2B91AF"/>
+                </a:solidFill>
+                <a:highlight>
+                  <a:srgbClr val="FFFFFF"/>
+                </a:highlight>
+              </a:rPr>
+              <a:t>BackRequestedEventArgs</a:t>
+            </a:r>
+            <a:r>
+              <a:rPr lang="en-US" sz="1600" dirty="0" smtClean="0">
+                <a:solidFill>
+                  <a:srgbClr val="000000"/>
+                </a:solidFill>
+                <a:highlight>
+                  <a:srgbClr val="FFFFFF"/>
+                </a:highlight>
+              </a:rPr>
+              <a:t> </a:t>
+            </a:r>
+            <a:r>
+              <a:rPr lang="en-US" sz="1600" dirty="0">
+                <a:solidFill>
+                  <a:srgbClr val="000000"/>
+                </a:solidFill>
+                <a:highlight>
+                  <a:srgbClr val="FFFFFF"/>
+                </a:highlight>
+              </a:rPr>
+              <a:t>e)</a:t>
+            </a:r>
+          </a:p>
+          <a:p>
+            <a:r>
+              <a:rPr lang="ru-RU" sz="1600" dirty="0">
+                <a:solidFill>
+                  <a:srgbClr val="000000"/>
+                </a:solidFill>
+                <a:highlight>
+                  <a:srgbClr val="FFFFFF"/>
+                </a:highlight>
+              </a:rPr>
+              <a:t>{</a:t>
+            </a:r>
+          </a:p>
+          <a:p>
+            <a:r>
+              <a:rPr lang="ru-RU" sz="1600" dirty="0" smtClean="0">
+                <a:solidFill>
+                  <a:srgbClr val="0000FF"/>
+                </a:solidFill>
+                <a:highlight>
+                  <a:srgbClr val="FFFFFF"/>
+                </a:highlight>
+              </a:rPr>
+              <a:t>    </a:t>
+            </a:r>
+            <a:r>
+              <a:rPr lang="en-US" sz="1600" dirty="0" smtClean="0">
+                <a:solidFill>
+                  <a:srgbClr val="0000FF"/>
+                </a:solidFill>
+                <a:highlight>
+                  <a:srgbClr val="FFFFFF"/>
+                </a:highlight>
+              </a:rPr>
+              <a:t>if</a:t>
+            </a:r>
+            <a:r>
+              <a:rPr lang="en-US" sz="1600" dirty="0" smtClean="0">
+                <a:solidFill>
+                  <a:srgbClr val="000000"/>
+                </a:solidFill>
+                <a:highlight>
+                  <a:srgbClr val="FFFFFF"/>
+                </a:highlight>
+              </a:rPr>
+              <a:t> </a:t>
+            </a:r>
+            <a:r>
+              <a:rPr lang="en-US" sz="1600" dirty="0">
+                <a:solidFill>
+                  <a:srgbClr val="000000"/>
+                </a:solidFill>
+                <a:highlight>
+                  <a:srgbClr val="FFFFFF"/>
+                </a:highlight>
+              </a:rPr>
+              <a:t>(!</a:t>
+            </a:r>
+            <a:r>
+              <a:rPr lang="en-US" sz="1600" dirty="0" err="1">
+                <a:solidFill>
+                  <a:srgbClr val="000000"/>
+                </a:solidFill>
+                <a:highlight>
+                  <a:srgbClr val="FFFFFF"/>
+                </a:highlight>
+              </a:rPr>
+              <a:t>e.Handled</a:t>
+            </a:r>
+            <a:r>
+              <a:rPr lang="en-US" sz="1600" dirty="0" smtClean="0">
+                <a:solidFill>
+                  <a:srgbClr val="000000"/>
+                </a:solidFill>
+                <a:highlight>
+                  <a:srgbClr val="FFFFFF"/>
+                </a:highlight>
+              </a:rPr>
+              <a:t>)</a:t>
+            </a:r>
+            <a:r>
+              <a:rPr lang="ru-RU" sz="1600" dirty="0" smtClean="0">
+                <a:solidFill>
+                  <a:srgbClr val="000000"/>
+                </a:solidFill>
+                <a:highlight>
+                  <a:srgbClr val="FFFFFF"/>
+                </a:highlight>
+              </a:rPr>
+              <a:t> {</a:t>
+            </a:r>
+            <a:endParaRPr lang="ru-RU" sz="1600" dirty="0">
+              <a:solidFill>
+                <a:srgbClr val="000000"/>
+              </a:solidFill>
+              <a:highlight>
+                <a:srgbClr val="FFFFFF"/>
+              </a:highlight>
+            </a:endParaRPr>
+          </a:p>
+          <a:p>
+            <a:r>
+              <a:rPr lang="ru-RU" sz="1600" dirty="0" smtClean="0">
+                <a:solidFill>
+                  <a:srgbClr val="2B91AF"/>
+                </a:solidFill>
+                <a:highlight>
+                  <a:srgbClr val="FFFFFF"/>
+                </a:highlight>
+              </a:rPr>
+              <a:t>        </a:t>
+            </a:r>
+            <a:r>
+              <a:rPr lang="en-US" sz="1600" dirty="0" smtClean="0">
+                <a:solidFill>
+                  <a:srgbClr val="2B91AF"/>
+                </a:solidFill>
+                <a:highlight>
+                  <a:srgbClr val="FFFFFF"/>
+                </a:highlight>
+              </a:rPr>
+              <a:t>Frame</a:t>
+            </a:r>
+            <a:r>
+              <a:rPr lang="en-US" sz="1600" dirty="0" smtClean="0">
+                <a:solidFill>
+                  <a:srgbClr val="000000"/>
+                </a:solidFill>
+                <a:highlight>
+                  <a:srgbClr val="FFFFFF"/>
+                </a:highlight>
+              </a:rPr>
+              <a:t> </a:t>
+            </a:r>
+            <a:r>
+              <a:rPr lang="en-US" sz="1600" dirty="0" err="1">
+                <a:solidFill>
+                  <a:srgbClr val="000000"/>
+                </a:solidFill>
+                <a:highlight>
+                  <a:srgbClr val="FFFFFF"/>
+                </a:highlight>
+              </a:rPr>
+              <a:t>frame</a:t>
+            </a:r>
+            <a:r>
+              <a:rPr lang="en-US" sz="1600" dirty="0">
+                <a:solidFill>
+                  <a:srgbClr val="000000"/>
+                </a:solidFill>
+                <a:highlight>
+                  <a:srgbClr val="FFFFFF"/>
+                </a:highlight>
+              </a:rPr>
+              <a:t> = </a:t>
+            </a:r>
+            <a:r>
+              <a:rPr lang="en-US" sz="1600" dirty="0" err="1">
+                <a:solidFill>
+                  <a:srgbClr val="2B91AF"/>
+                </a:solidFill>
+                <a:highlight>
+                  <a:srgbClr val="FFFFFF"/>
+                </a:highlight>
+              </a:rPr>
+              <a:t>Window</a:t>
+            </a:r>
+            <a:r>
+              <a:rPr lang="en-US" sz="1600" dirty="0" err="1">
+                <a:solidFill>
+                  <a:srgbClr val="000000"/>
+                </a:solidFill>
+                <a:highlight>
+                  <a:srgbClr val="FFFFFF"/>
+                </a:highlight>
+              </a:rPr>
+              <a:t>.Current.Content</a:t>
+            </a:r>
+            <a:r>
+              <a:rPr lang="en-US" sz="1600" dirty="0">
+                <a:solidFill>
+                  <a:srgbClr val="000000"/>
+                </a:solidFill>
+                <a:highlight>
+                  <a:srgbClr val="FFFFFF"/>
+                </a:highlight>
+              </a:rPr>
+              <a:t> </a:t>
+            </a:r>
+            <a:r>
+              <a:rPr lang="en-US" sz="1600" dirty="0">
+                <a:solidFill>
+                  <a:srgbClr val="0000FF"/>
+                </a:solidFill>
+                <a:highlight>
+                  <a:srgbClr val="FFFFFF"/>
+                </a:highlight>
+              </a:rPr>
+              <a:t>as</a:t>
+            </a:r>
+            <a:r>
+              <a:rPr lang="en-US" sz="1600" dirty="0">
+                <a:solidFill>
+                  <a:srgbClr val="000000"/>
+                </a:solidFill>
+                <a:highlight>
+                  <a:srgbClr val="FFFFFF"/>
+                </a:highlight>
+              </a:rPr>
+              <a:t> </a:t>
+            </a:r>
+            <a:r>
+              <a:rPr lang="en-US" sz="1600" dirty="0">
+                <a:solidFill>
+                  <a:srgbClr val="2B91AF"/>
+                </a:solidFill>
+                <a:highlight>
+                  <a:srgbClr val="FFFFFF"/>
+                </a:highlight>
+              </a:rPr>
+              <a:t>Frame</a:t>
+            </a:r>
+            <a:r>
+              <a:rPr lang="en-US" sz="1600" dirty="0">
+                <a:solidFill>
+                  <a:srgbClr val="000000"/>
+                </a:solidFill>
+                <a:highlight>
+                  <a:srgbClr val="FFFFFF"/>
+                </a:highlight>
+              </a:rPr>
+              <a:t>;</a:t>
+            </a:r>
+          </a:p>
+          <a:p>
+            <a:r>
+              <a:rPr lang="en-US" sz="1600" dirty="0">
+                <a:solidFill>
+                  <a:srgbClr val="000000"/>
+                </a:solidFill>
+                <a:highlight>
+                  <a:srgbClr val="FFFFFF"/>
+                </a:highlight>
+              </a:rPr>
+              <a:t>        </a:t>
+            </a:r>
+            <a:r>
+              <a:rPr lang="en-US" sz="1600" dirty="0">
+                <a:solidFill>
+                  <a:srgbClr val="0000FF"/>
+                </a:solidFill>
+                <a:highlight>
+                  <a:srgbClr val="FFFFFF"/>
+                </a:highlight>
+              </a:rPr>
+              <a:t>if</a:t>
+            </a:r>
+            <a:r>
+              <a:rPr lang="en-US" sz="1600" dirty="0">
+                <a:solidFill>
+                  <a:srgbClr val="000000"/>
+                </a:solidFill>
+                <a:highlight>
+                  <a:srgbClr val="FFFFFF"/>
+                </a:highlight>
+              </a:rPr>
+              <a:t> (</a:t>
+            </a:r>
+            <a:r>
+              <a:rPr lang="en-US" sz="1600" dirty="0" err="1">
+                <a:solidFill>
+                  <a:srgbClr val="000000"/>
+                </a:solidFill>
+                <a:highlight>
+                  <a:srgbClr val="FFFFFF"/>
+                </a:highlight>
+              </a:rPr>
+              <a:t>frame.CanGoBack</a:t>
+            </a:r>
+            <a:r>
+              <a:rPr lang="en-US" sz="1600" dirty="0" smtClean="0">
+                <a:solidFill>
+                  <a:srgbClr val="000000"/>
+                </a:solidFill>
+                <a:highlight>
+                  <a:srgbClr val="FFFFFF"/>
+                </a:highlight>
+              </a:rPr>
+              <a:t>)</a:t>
+            </a:r>
+            <a:r>
+              <a:rPr lang="ru-RU" sz="1600" dirty="0" smtClean="0">
+                <a:solidFill>
+                  <a:srgbClr val="000000"/>
+                </a:solidFill>
+                <a:highlight>
+                  <a:srgbClr val="FFFFFF"/>
+                </a:highlight>
+              </a:rPr>
+              <a:t> {</a:t>
+            </a:r>
+            <a:endParaRPr lang="ru-RU" sz="1600" dirty="0">
+              <a:solidFill>
+                <a:srgbClr val="000000"/>
+              </a:solidFill>
+              <a:highlight>
+                <a:srgbClr val="FFFFFF"/>
+              </a:highlight>
+            </a:endParaRPr>
+          </a:p>
+          <a:p>
+            <a:r>
+              <a:rPr lang="en-US" sz="1600" dirty="0">
+                <a:solidFill>
+                  <a:srgbClr val="000000"/>
+                </a:solidFill>
+                <a:highlight>
+                  <a:srgbClr val="FFFFFF"/>
+                </a:highlight>
+              </a:rPr>
+              <a:t>            </a:t>
+            </a:r>
+            <a:r>
+              <a:rPr lang="en-US" sz="1600" dirty="0" err="1">
+                <a:solidFill>
+                  <a:srgbClr val="000000"/>
+                </a:solidFill>
+                <a:highlight>
+                  <a:srgbClr val="FFFFFF"/>
+                </a:highlight>
+              </a:rPr>
+              <a:t>frame.GoBack</a:t>
+            </a:r>
+            <a:r>
+              <a:rPr lang="en-US" sz="1600" dirty="0">
+                <a:solidFill>
+                  <a:srgbClr val="000000"/>
+                </a:solidFill>
+                <a:highlight>
+                  <a:srgbClr val="FFFFFF"/>
+                </a:highlight>
+              </a:rPr>
+              <a:t>();</a:t>
+            </a:r>
+          </a:p>
+          <a:p>
+            <a:r>
+              <a:rPr lang="ru-RU" sz="1600" dirty="0" smtClean="0">
+                <a:solidFill>
+                  <a:srgbClr val="000000"/>
+                </a:solidFill>
+                <a:highlight>
+                  <a:srgbClr val="FFFFFF"/>
+                </a:highlight>
+              </a:rPr>
+              <a:t>            </a:t>
+            </a:r>
+            <a:r>
+              <a:rPr lang="en-US" sz="1600" dirty="0" err="1" smtClean="0">
+                <a:solidFill>
+                  <a:srgbClr val="000000"/>
+                </a:solidFill>
+                <a:highlight>
+                  <a:srgbClr val="FFFFFF"/>
+                </a:highlight>
+              </a:rPr>
+              <a:t>e.Handled</a:t>
+            </a:r>
+            <a:r>
+              <a:rPr lang="en-US" sz="1600" dirty="0" smtClean="0">
+                <a:solidFill>
+                  <a:srgbClr val="000000"/>
+                </a:solidFill>
+                <a:highlight>
+                  <a:srgbClr val="FFFFFF"/>
+                </a:highlight>
+              </a:rPr>
+              <a:t> </a:t>
+            </a:r>
+            <a:r>
+              <a:rPr lang="en-US" sz="1600" dirty="0">
+                <a:solidFill>
+                  <a:srgbClr val="000000"/>
+                </a:solidFill>
+                <a:highlight>
+                  <a:srgbClr val="FFFFFF"/>
+                </a:highlight>
+              </a:rPr>
+              <a:t>= </a:t>
+            </a:r>
+            <a:r>
+              <a:rPr lang="en-US" sz="1600" dirty="0">
+                <a:solidFill>
+                  <a:srgbClr val="0000FF"/>
+                </a:solidFill>
+                <a:highlight>
+                  <a:srgbClr val="FFFFFF"/>
+                </a:highlight>
+              </a:rPr>
+              <a:t>true</a:t>
+            </a:r>
+            <a:r>
+              <a:rPr lang="en-US" sz="1600" dirty="0">
+                <a:solidFill>
+                  <a:srgbClr val="000000"/>
+                </a:solidFill>
+                <a:highlight>
+                  <a:srgbClr val="FFFFFF"/>
+                </a:highlight>
+              </a:rPr>
+              <a:t>;</a:t>
+            </a:r>
+          </a:p>
+          <a:p>
+            <a:r>
+              <a:rPr lang="ru-RU" sz="1600" dirty="0">
+                <a:solidFill>
+                  <a:srgbClr val="000000"/>
+                </a:solidFill>
+                <a:highlight>
+                  <a:srgbClr val="FFFFFF"/>
+                </a:highlight>
+              </a:rPr>
+              <a:t>        }</a:t>
+            </a:r>
+          </a:p>
+          <a:p>
+            <a:r>
+              <a:rPr lang="ru-RU" sz="1600" dirty="0">
+                <a:solidFill>
+                  <a:srgbClr val="000000"/>
+                </a:solidFill>
+                <a:highlight>
+                  <a:srgbClr val="FFFFFF"/>
+                </a:highlight>
+              </a:rPr>
+              <a:t>    }</a:t>
+            </a:r>
+          </a:p>
+          <a:p>
+            <a:r>
+              <a:rPr lang="ru-RU" sz="1600" dirty="0">
+                <a:solidFill>
+                  <a:srgbClr val="000000"/>
+                </a:solidFill>
+                <a:highlight>
+                  <a:srgbClr val="FFFFFF"/>
+                </a:highlight>
+              </a:rPr>
+              <a:t>}</a:t>
+            </a:r>
+          </a:p>
+        </p:txBody>
+      </p:sp>
+      <p:sp>
+        <p:nvSpPr>
+          <p:cNvPr id="5" name="TextBox 4"/>
+          <p:cNvSpPr txBox="1"/>
+          <p:nvPr/>
+        </p:nvSpPr>
+        <p:spPr>
+          <a:xfrm>
+            <a:off x="516000" y="1089000"/>
+            <a:ext cx="7190776" cy="830997"/>
+          </a:xfrm>
+          <a:prstGeom prst="rect">
+            <a:avLst/>
+          </a:prstGeom>
+          <a:noFill/>
+        </p:spPr>
+        <p:txBody>
+          <a:bodyPr wrap="square" rtlCol="0">
+            <a:spAutoFit/>
+          </a:bodyPr>
+          <a:lstStyle/>
+          <a:p>
+            <a:r>
+              <a:rPr lang="ru-RU" sz="2400" dirty="0">
+                <a:latin typeface="+mj-lt"/>
+              </a:rPr>
+              <a:t>Л</a:t>
+            </a:r>
+            <a:r>
+              <a:rPr lang="ru-RU" sz="2400" dirty="0" smtClean="0">
+                <a:latin typeface="+mj-lt"/>
+              </a:rPr>
+              <a:t>огику обратной навигации можно разместить в </a:t>
+            </a:r>
+            <a:r>
+              <a:rPr lang="en-US" sz="2400" b="1" dirty="0" err="1" smtClean="0"/>
+              <a:t>App.xaml.cs</a:t>
+            </a:r>
+            <a:r>
+              <a:rPr lang="ru-RU" sz="2400" dirty="0">
+                <a:latin typeface="+mj-lt"/>
+              </a:rPr>
+              <a:t>:</a:t>
+            </a:r>
+          </a:p>
+        </p:txBody>
+      </p:sp>
+    </p:spTree>
+    <p:extLst>
+      <p:ext uri="{BB962C8B-B14F-4D97-AF65-F5344CB8AC3E}">
+        <p14:creationId xmlns:p14="http://schemas.microsoft.com/office/powerpoint/2010/main" val="1271477299"/>
+      </p:ext>
+    </p:extLst>
+  </p:cSld>
+  <p:clrMapOvr>
+    <a:masterClrMapping/>
+  </p:clrMapOvr>
+  <mc:AlternateContent xmlns:mc="http://schemas.openxmlformats.org/markup-compatibility/2006" xmlns:p14="http://schemas.microsoft.com/office/powerpoint/2010/main">
+    <mc:Choice Requires="p14">
+      <p:transition spd="slow" p14:dur="2000"/>
+    </mc:Choice>
+    <mc:Fallback xmlns="">
+      <p:transition spd="slow"/>
+    </mc:Fallback>
+  </mc:AlternateContent>
+</p:sld>
+</file>
+
+<file path=ppt/slides/slide12.xml><?xml version="1.0" encoding="utf-8"?>
+<p:sld xmlns:a="http://schemas.openxmlformats.org/drawingml/2006/main" xmlns:r="http://schemas.openxmlformats.org/officeDocument/2006/relationships" xmlns:p="http://schemas.openxmlformats.org/presentationml/2006/main">
+  <p:cSld>
+    <p:spTree>
+      <p:nvGrpSpPr>
+        <p:cNvPr id="1" name=""/>
+        <p:cNvGrpSpPr/>
+        <p:nvPr/>
+      </p:nvGrpSpPr>
+      <p:grpSpPr>
+        <a:xfrm>
+          <a:off x="0" y="0"/>
+          <a:ext cx="0" cy="0"/>
+          <a:chOff x="0" y="0"/>
+          <a:chExt cx="0" cy="0"/>
+        </a:xfrm>
+      </p:grpSpPr>
+      <p:sp>
+        <p:nvSpPr>
+          <p:cNvPr id="3" name="Заголовок 2"/>
+          <p:cNvSpPr>
+            <a:spLocks noGrp="1"/>
+          </p:cNvSpPr>
+          <p:nvPr>
+            <p:ph type="title"/>
+          </p:nvPr>
+        </p:nvSpPr>
+        <p:spPr>
+          <a:xfrm>
             <a:off x="876000" y="729000"/>
             <a:ext cx="9859116" cy="2628605"/>
           </a:xfrm>
@@ -28243,7 +28390,7 @@
 </p:sld>
 </file>
 
-<file path=ppt/slides/slide12.xml><?xml version="1.0" encoding="utf-8"?>
+<file path=ppt/slides/slide13.xml><?xml version="1.0" encoding="utf-8"?>
 <p:sld xmlns:a="http://schemas.openxmlformats.org/drawingml/2006/main" xmlns:r="http://schemas.openxmlformats.org/officeDocument/2006/relationships" xmlns:p="http://schemas.openxmlformats.org/presentationml/2006/main">
   <p:cSld>
     <p:spTree>
@@ -29367,7 +29514,7 @@
 </p:sld>
 </file>
 
-<file path=ppt/slides/slide13.xml><?xml version="1.0" encoding="utf-8"?>
+<file path=ppt/slides/slide14.xml><?xml version="1.0" encoding="utf-8"?>
 <p:sld xmlns:a="http://schemas.openxmlformats.org/drawingml/2006/main" xmlns:r="http://schemas.openxmlformats.org/officeDocument/2006/relationships" xmlns:p="http://schemas.openxmlformats.org/presentationml/2006/main">
   <p:cSld>
     <p:spTree>
@@ -29452,7 +29599,7 @@
 </p:sld>
 </file>
 
-<file path=ppt/slides/slide14.xml><?xml version="1.0" encoding="utf-8"?>
+<file path=ppt/slides/slide15.xml><?xml version="1.0" encoding="utf-8"?>
 <p:sld xmlns:a="http://schemas.openxmlformats.org/drawingml/2006/main" xmlns:r="http://schemas.openxmlformats.org/officeDocument/2006/relationships" xmlns:p="http://schemas.openxmlformats.org/presentationml/2006/main">
   <p:cSld>
     <p:spTree>
@@ -30223,7 +30370,7 @@
 </p:sld>
 </file>
 
-<file path=ppt/slides/slide15.xml><?xml version="1.0" encoding="utf-8"?>
+<file path=ppt/slides/slide16.xml><?xml version="1.0" encoding="utf-8"?>
 <p:sld xmlns:a="http://schemas.openxmlformats.org/drawingml/2006/main" xmlns:r="http://schemas.openxmlformats.org/officeDocument/2006/relationships" xmlns:p="http://schemas.openxmlformats.org/presentationml/2006/main">
   <p:cSld>
     <p:spTree>
@@ -30300,7 +30447,7 @@
 </p:sld>
 </file>
 
-<file path=ppt/slides/slide16.xml><?xml version="1.0" encoding="utf-8"?>
+<file path=ppt/slides/slide17.xml><?xml version="1.0" encoding="utf-8"?>
 <p:sld xmlns:a="http://schemas.openxmlformats.org/drawingml/2006/main" xmlns:r="http://schemas.openxmlformats.org/officeDocument/2006/relationships" xmlns:p="http://schemas.openxmlformats.org/presentationml/2006/main">
   <p:cSld>
     <p:spTree>
@@ -30558,7 +30705,7 @@
 </p:sld>
 </file>
 
-<file path=ppt/slides/slide17.xml><?xml version="1.0" encoding="utf-8"?>
+<file path=ppt/slides/slide18.xml><?xml version="1.0" encoding="utf-8"?>
 <p:sld xmlns:a="http://schemas.openxmlformats.org/drawingml/2006/main" xmlns:r="http://schemas.openxmlformats.org/officeDocument/2006/relationships" xmlns:p="http://schemas.openxmlformats.org/presentationml/2006/main">
   <p:cSld>
     <p:spTree>
@@ -30700,7 +30847,7 @@
 </p:sld>
 </file>
 
-<file path=ppt/slides/slide18.xml><?xml version="1.0" encoding="utf-8"?>
+<file path=ppt/slides/slide19.xml><?xml version="1.0" encoding="utf-8"?>
 <p:sld xmlns:a="http://schemas.openxmlformats.org/drawingml/2006/main" xmlns:r="http://schemas.openxmlformats.org/officeDocument/2006/relationships" xmlns:p="http://schemas.openxmlformats.org/presentationml/2006/main">
   <p:cSld>
     <p:spTree>
@@ -32425,6 +32572,187 @@
       </p:grpSpPr>
       <p:sp>
         <p:nvSpPr>
+          <p:cNvPr id="4" name="Заголовок 3"/>
+          <p:cNvSpPr>
+            <a:spLocks noGrp="1"/>
+          </p:cNvSpPr>
+          <p:nvPr>
+            <p:ph type="title"/>
+          </p:nvPr>
+        </p:nvSpPr>
+        <p:spPr/>
+        <p:txBody>
+          <a:bodyPr>
+            <a:normAutofit fontScale="90000"/>
+          </a:bodyPr>
+          <a:lstStyle/>
+          <a:p>
+            <a:r>
+              <a:rPr lang="ru-RU" dirty="0" smtClean="0"/>
+              <a:t>Передать данные можно не только параметром</a:t>
+            </a:r>
+            <a:endParaRPr lang="ru-RU" dirty="0"/>
+          </a:p>
+        </p:txBody>
+      </p:sp>
+      <p:sp>
+        <p:nvSpPr>
+          <p:cNvPr id="5" name="Объект 4"/>
+          <p:cNvSpPr>
+            <a:spLocks noGrp="1"/>
+          </p:cNvSpPr>
+          <p:nvPr>
+            <p:ph idx="1"/>
+          </p:nvPr>
+        </p:nvSpPr>
+        <p:spPr>
+          <a:xfrm>
+            <a:off x="1056000" y="1449000"/>
+            <a:ext cx="6300000" cy="4860000"/>
+          </a:xfrm>
+        </p:spPr>
+        <p:txBody>
+          <a:bodyPr>
+            <a:normAutofit lnSpcReduction="10000"/>
+          </a:bodyPr>
+          <a:lstStyle/>
+          <a:p>
+            <a:r>
+              <a:rPr lang="ru-RU" dirty="0" smtClean="0">
+                <a:latin typeface="+mj-lt"/>
+              </a:rPr>
+              <a:t>Через</a:t>
+            </a:r>
+            <a:r>
+              <a:rPr lang="en-US" dirty="0" smtClean="0">
+                <a:latin typeface="+mj-lt"/>
+              </a:rPr>
+              <a:t> </a:t>
+            </a:r>
+            <a:r>
+              <a:rPr lang="en-US" dirty="0" err="1" smtClean="0">
+                <a:latin typeface="+mj-lt"/>
+              </a:rPr>
+              <a:t>DataModel</a:t>
+            </a:r>
+            <a:endParaRPr lang="en-US" dirty="0" smtClean="0">
+              <a:latin typeface="+mj-lt"/>
+            </a:endParaRPr>
+          </a:p>
+          <a:p>
+            <a:pPr lvl="1"/>
+            <a:r>
+              <a:rPr lang="ru-RU" dirty="0" smtClean="0">
+                <a:latin typeface="+mj-lt"/>
+              </a:rPr>
+              <a:t>Изменения на одной странице автоматически приводят к изменению данных во всем приложении</a:t>
+            </a:r>
+            <a:endParaRPr lang="en-US" dirty="0" smtClean="0">
+              <a:latin typeface="+mj-lt"/>
+            </a:endParaRPr>
+          </a:p>
+          <a:p>
+            <a:r>
+              <a:rPr lang="ru-RU" dirty="0" smtClean="0">
+                <a:latin typeface="+mj-lt"/>
+              </a:rPr>
+              <a:t>Через свойства </a:t>
+            </a:r>
+            <a:r>
+              <a:rPr lang="en-US" dirty="0" smtClean="0">
+                <a:latin typeface="+mj-lt"/>
+              </a:rPr>
+              <a:t>(Application Settings)</a:t>
+            </a:r>
+            <a:endParaRPr lang="en-US" dirty="0" smtClean="0">
+              <a:latin typeface="+mj-lt"/>
+            </a:endParaRPr>
+          </a:p>
+          <a:p>
+            <a:r>
+              <a:rPr lang="ru-RU" dirty="0" smtClean="0">
+                <a:latin typeface="+mj-lt"/>
+              </a:rPr>
+              <a:t>Через файловое хранилище</a:t>
+            </a:r>
+            <a:endParaRPr lang="en-US" dirty="0" smtClean="0">
+              <a:latin typeface="+mj-lt"/>
+            </a:endParaRPr>
+          </a:p>
+          <a:p>
+            <a:r>
+              <a:rPr lang="ru-RU" dirty="0" smtClean="0">
+                <a:latin typeface="+mj-lt"/>
+              </a:rPr>
+              <a:t>Через статический класс</a:t>
+            </a:r>
+            <a:endParaRPr lang="en-US" dirty="0" smtClean="0">
+              <a:latin typeface="+mj-lt"/>
+            </a:endParaRPr>
+          </a:p>
+          <a:p>
+            <a:pPr lvl="1"/>
+            <a:r>
+              <a:rPr lang="ru-RU" dirty="0" smtClean="0">
+                <a:latin typeface="+mj-lt"/>
+              </a:rPr>
+              <a:t>Паттерн </a:t>
+            </a:r>
+            <a:r>
+              <a:rPr lang="en-US" dirty="0" smtClean="0">
+                <a:latin typeface="+mj-lt"/>
+              </a:rPr>
+              <a:t>singleton</a:t>
+            </a:r>
+            <a:endParaRPr lang="en-US" dirty="0" smtClean="0">
+              <a:latin typeface="+mj-lt"/>
+            </a:endParaRPr>
+          </a:p>
+          <a:p>
+            <a:r>
+              <a:rPr lang="en-US" dirty="0" smtClean="0">
+                <a:latin typeface="+mj-lt"/>
+              </a:rPr>
+              <a:t>…</a:t>
+            </a:r>
+            <a:endParaRPr lang="ru-RU" dirty="0">
+              <a:latin typeface="+mj-lt"/>
+            </a:endParaRPr>
+          </a:p>
+        </p:txBody>
+      </p:sp>
+    </p:spTree>
+    <p:extLst>
+      <p:ext uri="{BB962C8B-B14F-4D97-AF65-F5344CB8AC3E}">
+        <p14:creationId xmlns:p14="http://schemas.microsoft.com/office/powerpoint/2010/main" val="4225051832"/>
+      </p:ext>
+    </p:extLst>
+  </p:cSld>
+  <p:clrMapOvr>
+    <a:masterClrMapping/>
+  </p:clrMapOvr>
+</p:sld>
+</file>
+
+<file path=ppt/slides/slide5.xml><?xml version="1.0" encoding="utf-8"?>
+<p:sld xmlns:a="http://schemas.openxmlformats.org/drawingml/2006/main" xmlns:r="http://schemas.openxmlformats.org/officeDocument/2006/relationships" xmlns:p="http://schemas.openxmlformats.org/presentationml/2006/main">
+  <p:cSld>
+    <p:spTree>
+      <p:nvGrpSpPr>
+        <p:cNvPr id="1" name=""/>
+        <p:cNvGrpSpPr/>
+        <p:nvPr/>
+      </p:nvGrpSpPr>
+      <p:grpSpPr>
+        <a:xfrm>
+          <a:off x="0" y="0"/>
+          <a:ext cx="0" cy="0"/>
+          <a:chOff x="0" y="0"/>
+          <a:chExt cx="0" cy="0"/>
+        </a:xfrm>
+      </p:grpSpPr>
+      <p:sp>
+        <p:nvSpPr>
           <p:cNvPr id="3" name="Заголовок 2"/>
           <p:cNvSpPr>
             <a:spLocks noGrp="1"/>
@@ -32491,7 +32819,7 @@
 </p:sld>
 </file>
 
-<file path=ppt/slides/slide5.xml><?xml version="1.0" encoding="utf-8"?>
+<file path=ppt/slides/slide6.xml><?xml version="1.0" encoding="utf-8"?>
 <p:sld xmlns:a="http://schemas.openxmlformats.org/drawingml/2006/main" xmlns:r="http://schemas.openxmlformats.org/officeDocument/2006/relationships" xmlns:p="http://schemas.openxmlformats.org/presentationml/2006/main">
   <p:cSld>
     <p:spTree>
@@ -32559,7 +32887,7 @@
 </p:sld>
 </file>
 
-<file path=ppt/slides/slide6.xml><?xml version="1.0" encoding="utf-8"?>
+<file path=ppt/slides/slide7.xml><?xml version="1.0" encoding="utf-8"?>
 <p:sld xmlns:a="http://schemas.openxmlformats.org/drawingml/2006/main" xmlns:r="http://schemas.openxmlformats.org/officeDocument/2006/relationships" xmlns:p="http://schemas.openxmlformats.org/presentationml/2006/main">
   <p:cSld>
     <p:spTree>
@@ -32954,7 +33282,7 @@
 </p:sld>
 </file>
 
-<file path=ppt/slides/slide7.xml><?xml version="1.0" encoding="utf-8"?>
+<file path=ppt/slides/slide8.xml><?xml version="1.0" encoding="utf-8"?>
 <p:sld xmlns:a="http://schemas.openxmlformats.org/drawingml/2006/main" xmlns:r="http://schemas.openxmlformats.org/officeDocument/2006/relationships" xmlns:p="http://schemas.openxmlformats.org/presentationml/2006/main">
   <p:cSld>
     <p:spTree>
@@ -33449,7 +33777,7 @@
 </p:sld>
 </file>
 
-<file path=ppt/slides/slide8.xml><?xml version="1.0" encoding="utf-8"?>
+<file path=ppt/slides/slide9.xml><?xml version="1.0" encoding="utf-8"?>
 <p:sld xmlns:a="http://schemas.openxmlformats.org/drawingml/2006/main" xmlns:r="http://schemas.openxmlformats.org/officeDocument/2006/relationships" xmlns:p="http://schemas.openxmlformats.org/presentationml/2006/main">
   <p:cSld>
     <p:spTree>
@@ -34390,160 +34718,6 @@
     <p:extLst>
       <p:ext uri="{BB962C8B-B14F-4D97-AF65-F5344CB8AC3E}">
         <p14:creationId xmlns:p14="http://schemas.microsoft.com/office/powerpoint/2010/main" val="2679475675"/>
-      </p:ext>
-    </p:extLst>
-  </p:cSld>
-  <p:clrMapOvr>
-    <a:masterClrMapping/>
-  </p:clrMapOvr>
-  <mc:AlternateContent xmlns:mc="http://schemas.openxmlformats.org/markup-compatibility/2006" xmlns:p14="http://schemas.microsoft.com/office/powerpoint/2010/main">
-    <mc:Choice Requires="p14">
-      <p:transition spd="slow" p14:dur="2000"/>
-    </mc:Choice>
-    <mc:Fallback xmlns="">
-      <p:transition spd="slow"/>
-    </mc:Fallback>
-  </mc:AlternateContent>
-</p:sld>
-</file>
-
-<file path=ppt/slides/slide9.xml><?xml version="1.0" encoding="utf-8"?>
-<p:sld xmlns:a="http://schemas.openxmlformats.org/drawingml/2006/main" xmlns:r="http://schemas.openxmlformats.org/officeDocument/2006/relationships" xmlns:p="http://schemas.openxmlformats.org/presentationml/2006/main">
-  <p:cSld>
-    <p:spTree>
-      <p:nvGrpSpPr>
-        <p:cNvPr id="1" name=""/>
-        <p:cNvGrpSpPr/>
-        <p:nvPr/>
-      </p:nvGrpSpPr>
-      <p:grpSpPr>
-        <a:xfrm>
-          <a:off x="0" y="0"/>
-          <a:ext cx="0" cy="0"/>
-          <a:chOff x="0" y="0"/>
-          <a:chExt cx="0" cy="0"/>
-        </a:xfrm>
-      </p:grpSpPr>
-      <p:sp>
-        <p:nvSpPr>
-          <p:cNvPr id="2" name="Title 1"/>
-          <p:cNvSpPr>
-            <a:spLocks noGrp="1"/>
-          </p:cNvSpPr>
-          <p:nvPr>
-            <p:ph type="title"/>
-          </p:nvPr>
-        </p:nvSpPr>
-        <p:spPr>
-          <a:xfrm>
-            <a:off x="516000" y="369000"/>
-            <a:ext cx="10837800" cy="720000"/>
-          </a:xfrm>
-        </p:spPr>
-        <p:txBody>
-          <a:bodyPr/>
-          <a:lstStyle/>
-          <a:p>
-            <a:r>
-              <a:rPr lang="ru-RU" dirty="0" smtClean="0"/>
-              <a:t>Обратная навигация</a:t>
-            </a:r>
-            <a:endParaRPr lang="en-US" dirty="0"/>
-          </a:p>
-        </p:txBody>
-      </p:sp>
-      <p:sp>
-        <p:nvSpPr>
-          <p:cNvPr id="3" name="Content Placeholder 2"/>
-          <p:cNvSpPr>
-            <a:spLocks noGrp="1"/>
-          </p:cNvSpPr>
-          <p:nvPr>
-            <p:ph idx="1"/>
-          </p:nvPr>
-        </p:nvSpPr>
-        <p:spPr>
-          <a:xfrm>
-            <a:off x="554718" y="1449000"/>
-            <a:ext cx="7903576" cy="4860000"/>
-          </a:xfrm>
-        </p:spPr>
-        <p:txBody>
-          <a:bodyPr/>
-          <a:lstStyle/>
-          <a:p>
-            <a:r>
-              <a:rPr lang="ru-RU" dirty="0" smtClean="0"/>
-              <a:t>Нажатие кнопки </a:t>
-            </a:r>
-            <a:r>
-              <a:rPr lang="en-US" dirty="0" smtClean="0"/>
-              <a:t>back </a:t>
-            </a:r>
-            <a:r>
-              <a:rPr lang="ru-RU" dirty="0" smtClean="0"/>
-              <a:t>перемещает нас на предыдущую страницу в стеке навигации, затем на предыдущее приложение</a:t>
-            </a:r>
-            <a:endParaRPr lang="en-US" dirty="0" smtClean="0"/>
-          </a:p>
-          <a:p>
-            <a:pPr lvl="1"/>
-            <a:r>
-              <a:rPr lang="ru-RU" dirty="0" smtClean="0"/>
-              <a:t>Та же логика, что в </a:t>
-            </a:r>
-            <a:r>
-              <a:rPr lang="en-US" dirty="0" smtClean="0"/>
-              <a:t>Windows Phone </a:t>
-            </a:r>
-            <a:r>
-              <a:rPr lang="en-US" dirty="0"/>
-              <a:t>8.1</a:t>
-            </a:r>
-          </a:p>
-          <a:p>
-            <a:r>
-              <a:rPr lang="ru-RU" dirty="0" smtClean="0"/>
-              <a:t>Уход из приложения по </a:t>
-            </a:r>
-            <a:r>
-              <a:rPr lang="en-US" dirty="0" smtClean="0"/>
-              <a:t>back </a:t>
-            </a:r>
-            <a:r>
-              <a:rPr lang="ru-RU" dirty="0" smtClean="0"/>
-              <a:t>не закрывает его, а приостанавливает</a:t>
-            </a:r>
-            <a:endParaRPr lang="en-US" dirty="0" smtClean="0"/>
-          </a:p>
-          <a:p>
-            <a:r>
-              <a:rPr lang="ru-RU" dirty="0" smtClean="0"/>
-              <a:t>Для планшетов в </a:t>
-            </a:r>
-            <a:r>
-              <a:rPr lang="en-US" dirty="0" smtClean="0"/>
-              <a:t>split screen </a:t>
-            </a:r>
-            <a:r>
-              <a:rPr lang="ru-RU" dirty="0" smtClean="0"/>
-              <a:t>поддерживается два стека навигации</a:t>
-            </a:r>
-            <a:endParaRPr lang="en-US" dirty="0" smtClean="0"/>
-          </a:p>
-          <a:p>
-            <a:pPr lvl="1"/>
-            <a:endParaRPr lang="en-US" dirty="0" smtClean="0"/>
-          </a:p>
-          <a:p>
-            <a:endParaRPr lang="en-US" dirty="0"/>
-          </a:p>
-        </p:txBody>
-      </p:sp>
-    </p:spTree>
-    <p:extLst>
-      <p:ext uri="{BB962C8B-B14F-4D97-AF65-F5344CB8AC3E}">
-        <p14:creationId xmlns:p14="http://schemas.microsoft.com/office/powerpoint/2010/main" val="206534015"/>
       </p:ext>
     </p:extLst>
   </p:cSld>
@@ -36305,18 +36479,18 @@
 </file>
 
 <file path=customXml/item2.xml><?xml version="1.0" encoding="utf-8"?>
+<p:properties xmlns:p="http://schemas.microsoft.com/office/2006/metadata/properties" xmlns:xsi="http://www.w3.org/2001/XMLSchema-instance" xmlns:pc="http://schemas.microsoft.com/office/infopath/2007/PartnerControls">
+  <documentManagement/>
+</p:properties>
+</file>
+
+<file path=customXml/item3.xml><?xml version="1.0" encoding="utf-8"?>
 <?mso-contentType ?>
 <FormTemplates xmlns="http://schemas.microsoft.com/sharepoint/v3/contenttype/forms">
   <Display>DocumentLibraryForm</Display>
   <Edit>DocumentLibraryForm</Edit>
   <New>DocumentLibraryForm</New>
 </FormTemplates>
-</file>
-
-<file path=customXml/item3.xml><?xml version="1.0" encoding="utf-8"?>
-<p:properties xmlns:p="http://schemas.microsoft.com/office/2006/metadata/properties" xmlns:xsi="http://www.w3.org/2001/XMLSchema-instance" xmlns:pc="http://schemas.microsoft.com/office/infopath/2007/PartnerControls">
-  <documentManagement/>
-</p:properties>
 </file>
 
 <file path=customXml/itemProps1.xml><?xml version="1.0" encoding="utf-8"?>
@@ -36336,14 +36510,6 @@
 </file>
 
 <file path=customXml/itemProps2.xml><?xml version="1.0" encoding="utf-8"?>
-<ds:datastoreItem xmlns:ds="http://schemas.openxmlformats.org/officeDocument/2006/customXml" ds:itemID="{1C1284F2-D5A2-482D-9283-38905BD416F7}">
-  <ds:schemaRefs>
-    <ds:schemaRef ds:uri="http://schemas.microsoft.com/sharepoint/v3/contenttype/forms"/>
-  </ds:schemaRefs>
-</ds:datastoreItem>
-</file>
-
-<file path=customXml/itemProps3.xml><?xml version="1.0" encoding="utf-8"?>
 <ds:datastoreItem xmlns:ds="http://schemas.openxmlformats.org/officeDocument/2006/customXml" ds:itemID="{136497CF-FFDF-4FDB-8278-A4E189869E9B}">
   <ds:schemaRefs>
     <ds:schemaRef ds:uri="http://schemas.microsoft.com/office/2006/metadata/properties"/>
@@ -36356,4 +36522,12 @@
     <ds:schemaRef ds:uri="http://www.w3.org/XML/1998/namespace"/>
   </ds:schemaRefs>
 </ds:datastoreItem>
+</file>
+
+<file path=customXml/itemProps3.xml><?xml version="1.0" encoding="utf-8"?>
+<ds:datastoreItem xmlns:ds="http://schemas.openxmlformats.org/officeDocument/2006/customXml" ds:itemID="{1C1284F2-D5A2-482D-9283-38905BD416F7}">
+  <ds:schemaRefs>
+    <ds:schemaRef ds:uri="http://schemas.microsoft.com/sharepoint/v3/contenttype/forms"/>
+  </ds:schemaRefs>
+</ds:datastoreItem>
 </file>
</xml_diff>